<commit_message>
Unit of Work Repository
</commit_message>
<xml_diff>
--- a/Diapositivas/Design Patterns.pptx
+++ b/Diapositivas/Design Patterns.pptx
@@ -5,7 +5,7 @@
     <p:sldMasterId id="2147483660" r:id="rId1"/>
   </p:sldMasterIdLst>
   <p:notesMasterIdLst>
-    <p:notesMasterId r:id="rId16"/>
+    <p:notesMasterId r:id="rId20"/>
   </p:notesMasterIdLst>
   <p:sldIdLst>
     <p:sldId id="256" r:id="rId2"/>
@@ -22,6 +22,10 @@
     <p:sldId id="312" r:id="rId13"/>
     <p:sldId id="311" r:id="rId14"/>
     <p:sldId id="313" r:id="rId15"/>
+    <p:sldId id="314" r:id="rId16"/>
+    <p:sldId id="315" r:id="rId17"/>
+    <p:sldId id="316" r:id="rId18"/>
+    <p:sldId id="317" r:id="rId19"/>
   </p:sldIdLst>
   <p:sldSz cx="9144000" cy="6858000" type="screen4x3"/>
   <p:notesSz cx="6858000" cy="9144000"/>
@@ -1378,6 +1382,342 @@
             <a:fld id="{96DE5A63-0F1F-4DC0-ADE0-CC17EBA6F230}" type="slidenum">
               <a:rPr lang="es-PE" smtClean="0"/>
               <a:t>14</a:t>
+            </a:fld>
+            <a:endParaRPr lang="es-PE"/>
+          </a:p>
+        </p:txBody>
+      </p:sp>
+    </p:spTree>
+    <p:extLst>
+      <p:ext uri="{BB962C8B-B14F-4D97-AF65-F5344CB8AC3E}">
+        <p14:creationId xmlns:p14="http://schemas.microsoft.com/office/powerpoint/2010/main" val="3614550747"/>
+      </p:ext>
+    </p:extLst>
+  </p:cSld>
+  <p:clrMapOvr>
+    <a:masterClrMapping/>
+  </p:clrMapOvr>
+</p:notes>
+</file>
+
+<file path=ppt/notesSlides/notesSlide15.xml><?xml version="1.0" encoding="utf-8"?>
+<p:notes xmlns:a="http://schemas.openxmlformats.org/drawingml/2006/main" xmlns:r="http://schemas.openxmlformats.org/officeDocument/2006/relationships" xmlns:p="http://schemas.openxmlformats.org/presentationml/2006/main">
+  <p:cSld>
+    <p:spTree>
+      <p:nvGrpSpPr>
+        <p:cNvPr id="1" name=""/>
+        <p:cNvGrpSpPr/>
+        <p:nvPr/>
+      </p:nvGrpSpPr>
+      <p:grpSpPr>
+        <a:xfrm>
+          <a:off x="0" y="0"/>
+          <a:ext cx="0" cy="0"/>
+          <a:chOff x="0" y="0"/>
+          <a:chExt cx="0" cy="0"/>
+        </a:xfrm>
+      </p:grpSpPr>
+      <p:sp>
+        <p:nvSpPr>
+          <p:cNvPr id="2" name="1 Marcador de imagen de diapositiva"/>
+          <p:cNvSpPr>
+            <a:spLocks noGrp="1" noRot="1" noChangeAspect="1"/>
+          </p:cNvSpPr>
+          <p:nvPr>
+            <p:ph type="sldImg"/>
+          </p:nvPr>
+        </p:nvSpPr>
+        <p:spPr/>
+      </p:sp>
+      <p:sp>
+        <p:nvSpPr>
+          <p:cNvPr id="3" name="2 Marcador de notas"/>
+          <p:cNvSpPr>
+            <a:spLocks noGrp="1"/>
+          </p:cNvSpPr>
+          <p:nvPr>
+            <p:ph type="body" idx="1"/>
+          </p:nvPr>
+        </p:nvSpPr>
+        <p:spPr/>
+        <p:txBody>
+          <a:bodyPr/>
+          <a:lstStyle/>
+          <a:p>
+            <a:endParaRPr lang="es-PE" dirty="0"/>
+          </a:p>
+        </p:txBody>
+      </p:sp>
+      <p:sp>
+        <p:nvSpPr>
+          <p:cNvPr id="4" name="3 Marcador de número de diapositiva"/>
+          <p:cNvSpPr>
+            <a:spLocks noGrp="1"/>
+          </p:cNvSpPr>
+          <p:nvPr>
+            <p:ph type="sldNum" sz="quarter" idx="10"/>
+          </p:nvPr>
+        </p:nvSpPr>
+        <p:spPr/>
+        <p:txBody>
+          <a:bodyPr/>
+          <a:lstStyle/>
+          <a:p>
+            <a:fld id="{96DE5A63-0F1F-4DC0-ADE0-CC17EBA6F230}" type="slidenum">
+              <a:rPr lang="es-PE" smtClean="0"/>
+              <a:t>15</a:t>
+            </a:fld>
+            <a:endParaRPr lang="es-PE"/>
+          </a:p>
+        </p:txBody>
+      </p:sp>
+    </p:spTree>
+    <p:extLst>
+      <p:ext uri="{BB962C8B-B14F-4D97-AF65-F5344CB8AC3E}">
+        <p14:creationId xmlns:p14="http://schemas.microsoft.com/office/powerpoint/2010/main" val="3614550747"/>
+      </p:ext>
+    </p:extLst>
+  </p:cSld>
+  <p:clrMapOvr>
+    <a:masterClrMapping/>
+  </p:clrMapOvr>
+</p:notes>
+</file>
+
+<file path=ppt/notesSlides/notesSlide16.xml><?xml version="1.0" encoding="utf-8"?>
+<p:notes xmlns:a="http://schemas.openxmlformats.org/drawingml/2006/main" xmlns:r="http://schemas.openxmlformats.org/officeDocument/2006/relationships" xmlns:p="http://schemas.openxmlformats.org/presentationml/2006/main">
+  <p:cSld>
+    <p:spTree>
+      <p:nvGrpSpPr>
+        <p:cNvPr id="1" name=""/>
+        <p:cNvGrpSpPr/>
+        <p:nvPr/>
+      </p:nvGrpSpPr>
+      <p:grpSpPr>
+        <a:xfrm>
+          <a:off x="0" y="0"/>
+          <a:ext cx="0" cy="0"/>
+          <a:chOff x="0" y="0"/>
+          <a:chExt cx="0" cy="0"/>
+        </a:xfrm>
+      </p:grpSpPr>
+      <p:sp>
+        <p:nvSpPr>
+          <p:cNvPr id="2" name="1 Marcador de imagen de diapositiva"/>
+          <p:cNvSpPr>
+            <a:spLocks noGrp="1" noRot="1" noChangeAspect="1"/>
+          </p:cNvSpPr>
+          <p:nvPr>
+            <p:ph type="sldImg"/>
+          </p:nvPr>
+        </p:nvSpPr>
+        <p:spPr/>
+      </p:sp>
+      <p:sp>
+        <p:nvSpPr>
+          <p:cNvPr id="3" name="2 Marcador de notas"/>
+          <p:cNvSpPr>
+            <a:spLocks noGrp="1"/>
+          </p:cNvSpPr>
+          <p:nvPr>
+            <p:ph type="body" idx="1"/>
+          </p:nvPr>
+        </p:nvSpPr>
+        <p:spPr/>
+        <p:txBody>
+          <a:bodyPr/>
+          <a:lstStyle/>
+          <a:p>
+            <a:endParaRPr lang="es-PE" dirty="0"/>
+          </a:p>
+        </p:txBody>
+      </p:sp>
+      <p:sp>
+        <p:nvSpPr>
+          <p:cNvPr id="4" name="3 Marcador de número de diapositiva"/>
+          <p:cNvSpPr>
+            <a:spLocks noGrp="1"/>
+          </p:cNvSpPr>
+          <p:nvPr>
+            <p:ph type="sldNum" sz="quarter" idx="10"/>
+          </p:nvPr>
+        </p:nvSpPr>
+        <p:spPr/>
+        <p:txBody>
+          <a:bodyPr/>
+          <a:lstStyle/>
+          <a:p>
+            <a:fld id="{96DE5A63-0F1F-4DC0-ADE0-CC17EBA6F230}" type="slidenum">
+              <a:rPr lang="es-PE" smtClean="0"/>
+              <a:t>16</a:t>
+            </a:fld>
+            <a:endParaRPr lang="es-PE"/>
+          </a:p>
+        </p:txBody>
+      </p:sp>
+    </p:spTree>
+    <p:extLst>
+      <p:ext uri="{BB962C8B-B14F-4D97-AF65-F5344CB8AC3E}">
+        <p14:creationId xmlns:p14="http://schemas.microsoft.com/office/powerpoint/2010/main" val="3614550747"/>
+      </p:ext>
+    </p:extLst>
+  </p:cSld>
+  <p:clrMapOvr>
+    <a:masterClrMapping/>
+  </p:clrMapOvr>
+</p:notes>
+</file>
+
+<file path=ppt/notesSlides/notesSlide17.xml><?xml version="1.0" encoding="utf-8"?>
+<p:notes xmlns:a="http://schemas.openxmlformats.org/drawingml/2006/main" xmlns:r="http://schemas.openxmlformats.org/officeDocument/2006/relationships" xmlns:p="http://schemas.openxmlformats.org/presentationml/2006/main">
+  <p:cSld>
+    <p:spTree>
+      <p:nvGrpSpPr>
+        <p:cNvPr id="1" name=""/>
+        <p:cNvGrpSpPr/>
+        <p:nvPr/>
+      </p:nvGrpSpPr>
+      <p:grpSpPr>
+        <a:xfrm>
+          <a:off x="0" y="0"/>
+          <a:ext cx="0" cy="0"/>
+          <a:chOff x="0" y="0"/>
+          <a:chExt cx="0" cy="0"/>
+        </a:xfrm>
+      </p:grpSpPr>
+      <p:sp>
+        <p:nvSpPr>
+          <p:cNvPr id="2" name="1 Marcador de imagen de diapositiva"/>
+          <p:cNvSpPr>
+            <a:spLocks noGrp="1" noRot="1" noChangeAspect="1"/>
+          </p:cNvSpPr>
+          <p:nvPr>
+            <p:ph type="sldImg"/>
+          </p:nvPr>
+        </p:nvSpPr>
+        <p:spPr/>
+      </p:sp>
+      <p:sp>
+        <p:nvSpPr>
+          <p:cNvPr id="3" name="2 Marcador de notas"/>
+          <p:cNvSpPr>
+            <a:spLocks noGrp="1"/>
+          </p:cNvSpPr>
+          <p:nvPr>
+            <p:ph type="body" idx="1"/>
+          </p:nvPr>
+        </p:nvSpPr>
+        <p:spPr/>
+        <p:txBody>
+          <a:bodyPr/>
+          <a:lstStyle/>
+          <a:p>
+            <a:endParaRPr lang="es-PE" dirty="0"/>
+          </a:p>
+        </p:txBody>
+      </p:sp>
+      <p:sp>
+        <p:nvSpPr>
+          <p:cNvPr id="4" name="3 Marcador de número de diapositiva"/>
+          <p:cNvSpPr>
+            <a:spLocks noGrp="1"/>
+          </p:cNvSpPr>
+          <p:nvPr>
+            <p:ph type="sldNum" sz="quarter" idx="10"/>
+          </p:nvPr>
+        </p:nvSpPr>
+        <p:spPr/>
+        <p:txBody>
+          <a:bodyPr/>
+          <a:lstStyle/>
+          <a:p>
+            <a:fld id="{96DE5A63-0F1F-4DC0-ADE0-CC17EBA6F230}" type="slidenum">
+              <a:rPr lang="es-PE" smtClean="0"/>
+              <a:t>17</a:t>
+            </a:fld>
+            <a:endParaRPr lang="es-PE"/>
+          </a:p>
+        </p:txBody>
+      </p:sp>
+    </p:spTree>
+    <p:extLst>
+      <p:ext uri="{BB962C8B-B14F-4D97-AF65-F5344CB8AC3E}">
+        <p14:creationId xmlns:p14="http://schemas.microsoft.com/office/powerpoint/2010/main" val="3614550747"/>
+      </p:ext>
+    </p:extLst>
+  </p:cSld>
+  <p:clrMapOvr>
+    <a:masterClrMapping/>
+  </p:clrMapOvr>
+</p:notes>
+</file>
+
+<file path=ppt/notesSlides/notesSlide18.xml><?xml version="1.0" encoding="utf-8"?>
+<p:notes xmlns:a="http://schemas.openxmlformats.org/drawingml/2006/main" xmlns:r="http://schemas.openxmlformats.org/officeDocument/2006/relationships" xmlns:p="http://schemas.openxmlformats.org/presentationml/2006/main">
+  <p:cSld>
+    <p:spTree>
+      <p:nvGrpSpPr>
+        <p:cNvPr id="1" name=""/>
+        <p:cNvGrpSpPr/>
+        <p:nvPr/>
+      </p:nvGrpSpPr>
+      <p:grpSpPr>
+        <a:xfrm>
+          <a:off x="0" y="0"/>
+          <a:ext cx="0" cy="0"/>
+          <a:chOff x="0" y="0"/>
+          <a:chExt cx="0" cy="0"/>
+        </a:xfrm>
+      </p:grpSpPr>
+      <p:sp>
+        <p:nvSpPr>
+          <p:cNvPr id="2" name="1 Marcador de imagen de diapositiva"/>
+          <p:cNvSpPr>
+            <a:spLocks noGrp="1" noRot="1" noChangeAspect="1"/>
+          </p:cNvSpPr>
+          <p:nvPr>
+            <p:ph type="sldImg"/>
+          </p:nvPr>
+        </p:nvSpPr>
+        <p:spPr/>
+      </p:sp>
+      <p:sp>
+        <p:nvSpPr>
+          <p:cNvPr id="3" name="2 Marcador de notas"/>
+          <p:cNvSpPr>
+            <a:spLocks noGrp="1"/>
+          </p:cNvSpPr>
+          <p:nvPr>
+            <p:ph type="body" idx="1"/>
+          </p:nvPr>
+        </p:nvSpPr>
+        <p:spPr/>
+        <p:txBody>
+          <a:bodyPr/>
+          <a:lstStyle/>
+          <a:p>
+            <a:endParaRPr lang="es-PE" dirty="0"/>
+          </a:p>
+        </p:txBody>
+      </p:sp>
+      <p:sp>
+        <p:nvSpPr>
+          <p:cNvPr id="4" name="3 Marcador de número de diapositiva"/>
+          <p:cNvSpPr>
+            <a:spLocks noGrp="1"/>
+          </p:cNvSpPr>
+          <p:nvPr>
+            <p:ph type="sldNum" sz="quarter" idx="10"/>
+          </p:nvPr>
+        </p:nvSpPr>
+        <p:spPr/>
+        <p:txBody>
+          <a:bodyPr/>
+          <a:lstStyle/>
+          <a:p>
+            <a:fld id="{96DE5A63-0F1F-4DC0-ADE0-CC17EBA6F230}" type="slidenum">
+              <a:rPr lang="es-PE" smtClean="0"/>
+              <a:t>18</a:t>
             </a:fld>
             <a:endParaRPr lang="es-PE"/>
           </a:p>
@@ -6942,16 +7282,6 @@
               </a:rPr>
               <a:t>Concurrencia</a:t>
             </a:r>
-            <a:endParaRPr lang="es-PE" sz="2800" dirty="0" smtClean="0">
-              <a:solidFill>
-                <a:schemeClr val="bg1">
-                  <a:lumMod val="95000"/>
-                  <a:lumOff val="5000"/>
-                </a:schemeClr>
-              </a:solidFill>
-              <a:latin typeface="Arial" pitchFamily="34" charset="0"/>
-              <a:cs typeface="Arial" pitchFamily="34" charset="0"/>
-            </a:endParaRPr>
           </a:p>
           <a:p>
             <a:pPr marL="0" indent="0" algn="ctr">
@@ -7058,6 +7388,835 @@
     <p:extLst>
       <p:ext uri="{BB962C8B-B14F-4D97-AF65-F5344CB8AC3E}">
         <p14:creationId xmlns:p14="http://schemas.microsoft.com/office/powerpoint/2010/main" val="25800213"/>
+      </p:ext>
+    </p:extLst>
+  </p:cSld>
+  <p:clrMapOvr>
+    <a:masterClrMapping/>
+  </p:clrMapOvr>
+  <mc:AlternateContent xmlns:mc="http://schemas.openxmlformats.org/markup-compatibility/2006" xmlns:p14="http://schemas.microsoft.com/office/powerpoint/2010/main">
+    <mc:Choice Requires="p14">
+      <p:transition p14:dur="0"/>
+    </mc:Choice>
+    <mc:Fallback xmlns="">
+      <p:transition/>
+    </mc:Fallback>
+  </mc:AlternateContent>
+  <p:timing>
+    <p:tnLst>
+      <p:par>
+        <p:cTn id="1" dur="indefinite" restart="never" nodeType="tmRoot"/>
+      </p:par>
+    </p:tnLst>
+  </p:timing>
+</p:sld>
+</file>
+
+<file path=ppt/slides/slide15.xml><?xml version="1.0" encoding="utf-8"?>
+<p:sld xmlns:a="http://schemas.openxmlformats.org/drawingml/2006/main" xmlns:r="http://schemas.openxmlformats.org/officeDocument/2006/relationships" xmlns:p="http://schemas.openxmlformats.org/presentationml/2006/main">
+  <p:cSld>
+    <p:spTree>
+      <p:nvGrpSpPr>
+        <p:cNvPr id="1" name=""/>
+        <p:cNvGrpSpPr/>
+        <p:nvPr/>
+      </p:nvGrpSpPr>
+      <p:grpSpPr>
+        <a:xfrm>
+          <a:off x="0" y="0"/>
+          <a:ext cx="0" cy="0"/>
+          <a:chOff x="0" y="0"/>
+          <a:chExt cx="0" cy="0"/>
+        </a:xfrm>
+      </p:grpSpPr>
+      <p:sp>
+        <p:nvSpPr>
+          <p:cNvPr id="38" name="2 Marcador de contenido"/>
+          <p:cNvSpPr>
+            <a:spLocks noGrp="1"/>
+          </p:cNvSpPr>
+          <p:nvPr>
+            <p:ph idx="1"/>
+          </p:nvPr>
+        </p:nvSpPr>
+        <p:spPr>
+          <a:xfrm>
+            <a:off x="467544" y="2132856"/>
+            <a:ext cx="8352928" cy="2736304"/>
+          </a:xfrm>
+        </p:spPr>
+        <p:txBody>
+          <a:bodyPr/>
+          <a:lstStyle/>
+          <a:p>
+            <a:pPr>
+              <a:buSzPct val="100000"/>
+            </a:pPr>
+            <a:r>
+              <a:rPr lang="es-PE" sz="2400" dirty="0" smtClean="0">
+                <a:solidFill>
+                  <a:schemeClr val="bg1">
+                    <a:lumMod val="95000"/>
+                    <a:lumOff val="5000"/>
+                  </a:schemeClr>
+                </a:solidFill>
+                <a:latin typeface="Arial" pitchFamily="34" charset="0"/>
+                <a:cs typeface="Arial" pitchFamily="34" charset="0"/>
+              </a:rPr>
+              <a:t>Formar 2 grupos de personas.</a:t>
+            </a:r>
+          </a:p>
+          <a:p>
+            <a:pPr>
+              <a:buSzPct val="100000"/>
+            </a:pPr>
+            <a:endParaRPr lang="es-PE" sz="2400" dirty="0" smtClean="0">
+              <a:solidFill>
+                <a:schemeClr val="bg1">
+                  <a:lumMod val="95000"/>
+                  <a:lumOff val="5000"/>
+                </a:schemeClr>
+              </a:solidFill>
+              <a:latin typeface="Arial" pitchFamily="34" charset="0"/>
+              <a:cs typeface="Arial" pitchFamily="34" charset="0"/>
+            </a:endParaRPr>
+          </a:p>
+          <a:p>
+            <a:pPr>
+              <a:buSzPct val="100000"/>
+            </a:pPr>
+            <a:r>
+              <a:rPr lang="es-PE" sz="2400" dirty="0" smtClean="0">
+                <a:solidFill>
+                  <a:schemeClr val="bg1">
+                    <a:lumMod val="95000"/>
+                    <a:lumOff val="5000"/>
+                  </a:schemeClr>
+                </a:solidFill>
+                <a:latin typeface="Arial" pitchFamily="34" charset="0"/>
+                <a:cs typeface="Arial" pitchFamily="34" charset="0"/>
+              </a:rPr>
+              <a:t>A cada uno se le ha asignado material que corresponde a un patr</a:t>
+            </a:r>
+            <a:r>
+              <a:rPr lang="es-PE" sz="2400" dirty="0" smtClean="0">
+                <a:solidFill>
+                  <a:schemeClr val="bg1">
+                    <a:lumMod val="95000"/>
+                    <a:lumOff val="5000"/>
+                  </a:schemeClr>
+                </a:solidFill>
+                <a:latin typeface="Arial" pitchFamily="34" charset="0"/>
+                <a:cs typeface="Arial" pitchFamily="34" charset="0"/>
+              </a:rPr>
+              <a:t>ón empresarial de diseño.</a:t>
+            </a:r>
+          </a:p>
+          <a:p>
+            <a:pPr>
+              <a:buSzPct val="100000"/>
+            </a:pPr>
+            <a:endParaRPr lang="es-PE" sz="2400" dirty="0" smtClean="0">
+              <a:solidFill>
+                <a:schemeClr val="bg1">
+                  <a:lumMod val="95000"/>
+                  <a:lumOff val="5000"/>
+                </a:schemeClr>
+              </a:solidFill>
+              <a:latin typeface="Arial" pitchFamily="34" charset="0"/>
+              <a:cs typeface="Arial" pitchFamily="34" charset="0"/>
+            </a:endParaRPr>
+          </a:p>
+          <a:p>
+            <a:pPr>
+              <a:buSzPct val="100000"/>
+            </a:pPr>
+            <a:r>
+              <a:rPr lang="es-PE" sz="2400" dirty="0" smtClean="0">
+                <a:solidFill>
+                  <a:schemeClr val="bg1">
+                    <a:lumMod val="95000"/>
+                    <a:lumOff val="5000"/>
+                  </a:schemeClr>
+                </a:solidFill>
+                <a:latin typeface="Arial" pitchFamily="34" charset="0"/>
+                <a:cs typeface="Arial" pitchFamily="34" charset="0"/>
+              </a:rPr>
+              <a:t>Individualmente deberán analizar el material y entender el patrón que le ha sido asignado.</a:t>
+            </a:r>
+          </a:p>
+          <a:p>
+            <a:pPr lvl="1">
+              <a:buSzPct val="100000"/>
+            </a:pPr>
+            <a:r>
+              <a:rPr lang="es-PE" sz="2000" dirty="0" smtClean="0">
+                <a:solidFill>
+                  <a:schemeClr val="bg1">
+                    <a:lumMod val="95000"/>
+                    <a:lumOff val="5000"/>
+                  </a:schemeClr>
+                </a:solidFill>
+                <a:latin typeface="Arial" pitchFamily="34" charset="0"/>
+                <a:cs typeface="Arial" pitchFamily="34" charset="0"/>
+              </a:rPr>
+              <a:t>Tiempo: 15 minutos.</a:t>
+            </a:r>
+          </a:p>
+        </p:txBody>
+      </p:sp>
+      <p:sp>
+        <p:nvSpPr>
+          <p:cNvPr id="3" name="2 CuadroTexto"/>
+          <p:cNvSpPr txBox="1"/>
+          <p:nvPr/>
+        </p:nvSpPr>
+        <p:spPr>
+          <a:xfrm>
+            <a:off x="539552" y="260648"/>
+            <a:ext cx="8136904" cy="1446550"/>
+          </a:xfrm>
+          <a:prstGeom prst="rect">
+            <a:avLst/>
+          </a:prstGeom>
+          <a:noFill/>
+        </p:spPr>
+        <p:txBody>
+          <a:bodyPr wrap="square" rtlCol="0">
+            <a:spAutoFit/>
+          </a:bodyPr>
+          <a:lstStyle/>
+          <a:p>
+            <a:pPr algn="ctr"/>
+            <a:r>
+              <a:rPr lang="es-PE" sz="4400" dirty="0" smtClean="0">
+                <a:solidFill>
+                  <a:srgbClr val="00B050"/>
+                </a:solidFill>
+                <a:latin typeface="Arial" pitchFamily="34" charset="0"/>
+                <a:cs typeface="Arial" pitchFamily="34" charset="0"/>
+              </a:rPr>
+              <a:t>Ejercicio – Parte 1</a:t>
+            </a:r>
+            <a:br>
+              <a:rPr lang="es-PE" sz="4400" dirty="0" smtClean="0">
+                <a:solidFill>
+                  <a:srgbClr val="00B050"/>
+                </a:solidFill>
+                <a:latin typeface="Arial" pitchFamily="34" charset="0"/>
+                <a:cs typeface="Arial" pitchFamily="34" charset="0"/>
+              </a:rPr>
+            </a:br>
+            <a:r>
+              <a:rPr lang="es-PE" sz="4400" dirty="0" smtClean="0">
+                <a:solidFill>
+                  <a:srgbClr val="00B050"/>
+                </a:solidFill>
+                <a:latin typeface="Arial" pitchFamily="34" charset="0"/>
+                <a:cs typeface="Arial" pitchFamily="34" charset="0"/>
+              </a:rPr>
+              <a:t>Entendiendo</a:t>
+            </a:r>
+            <a:endParaRPr lang="es-PE" sz="4400" dirty="0" smtClean="0">
+              <a:solidFill>
+                <a:srgbClr val="00B050"/>
+              </a:solidFill>
+              <a:latin typeface="Arial" pitchFamily="34" charset="0"/>
+              <a:cs typeface="Arial" pitchFamily="34" charset="0"/>
+            </a:endParaRPr>
+          </a:p>
+        </p:txBody>
+      </p:sp>
+    </p:spTree>
+    <p:extLst>
+      <p:ext uri="{BB962C8B-B14F-4D97-AF65-F5344CB8AC3E}">
+        <p14:creationId xmlns:p14="http://schemas.microsoft.com/office/powerpoint/2010/main" val="3717724718"/>
+      </p:ext>
+    </p:extLst>
+  </p:cSld>
+  <p:clrMapOvr>
+    <a:masterClrMapping/>
+  </p:clrMapOvr>
+  <mc:AlternateContent xmlns:mc="http://schemas.openxmlformats.org/markup-compatibility/2006" xmlns:p14="http://schemas.microsoft.com/office/powerpoint/2010/main">
+    <mc:Choice Requires="p14">
+      <p:transition p14:dur="0"/>
+    </mc:Choice>
+    <mc:Fallback xmlns="">
+      <p:transition/>
+    </mc:Fallback>
+  </mc:AlternateContent>
+  <p:timing>
+    <p:tnLst>
+      <p:par>
+        <p:cTn id="1" dur="indefinite" restart="never" nodeType="tmRoot"/>
+      </p:par>
+    </p:tnLst>
+  </p:timing>
+</p:sld>
+</file>
+
+<file path=ppt/slides/slide16.xml><?xml version="1.0" encoding="utf-8"?>
+<p:sld xmlns:a="http://schemas.openxmlformats.org/drawingml/2006/main" xmlns:r="http://schemas.openxmlformats.org/officeDocument/2006/relationships" xmlns:p="http://schemas.openxmlformats.org/presentationml/2006/main">
+  <p:cSld>
+    <p:spTree>
+      <p:nvGrpSpPr>
+        <p:cNvPr id="1" name=""/>
+        <p:cNvGrpSpPr/>
+        <p:nvPr/>
+      </p:nvGrpSpPr>
+      <p:grpSpPr>
+        <a:xfrm>
+          <a:off x="0" y="0"/>
+          <a:ext cx="0" cy="0"/>
+          <a:chOff x="0" y="0"/>
+          <a:chExt cx="0" cy="0"/>
+        </a:xfrm>
+      </p:grpSpPr>
+      <p:sp>
+        <p:nvSpPr>
+          <p:cNvPr id="38" name="2 Marcador de contenido"/>
+          <p:cNvSpPr>
+            <a:spLocks noGrp="1"/>
+          </p:cNvSpPr>
+          <p:nvPr>
+            <p:ph idx="1"/>
+          </p:nvPr>
+        </p:nvSpPr>
+        <p:spPr>
+          <a:xfrm>
+            <a:off x="467544" y="2204864"/>
+            <a:ext cx="8352928" cy="2736304"/>
+          </a:xfrm>
+        </p:spPr>
+        <p:txBody>
+          <a:bodyPr/>
+          <a:lstStyle/>
+          <a:p>
+            <a:pPr>
+              <a:buSzPct val="100000"/>
+            </a:pPr>
+            <a:r>
+              <a:rPr lang="es-PE" sz="2400" dirty="0" smtClean="0">
+                <a:solidFill>
+                  <a:schemeClr val="bg1">
+                    <a:lumMod val="95000"/>
+                    <a:lumOff val="5000"/>
+                  </a:schemeClr>
+                </a:solidFill>
+                <a:latin typeface="Arial" pitchFamily="34" charset="0"/>
+                <a:cs typeface="Arial" pitchFamily="34" charset="0"/>
+              </a:rPr>
+              <a:t>Juntarse todos aquellos a los cuales les ha tocado el mismo patrón, discutir lo entendido y pensar cual es la mejor manera de explicar el patrón a su grupo original.</a:t>
+            </a:r>
+            <a:endParaRPr lang="es-PE" sz="2400" dirty="0" smtClean="0">
+              <a:solidFill>
+                <a:schemeClr val="bg1">
+                  <a:lumMod val="95000"/>
+                  <a:lumOff val="5000"/>
+                </a:schemeClr>
+              </a:solidFill>
+              <a:latin typeface="Arial" pitchFamily="34" charset="0"/>
+              <a:cs typeface="Arial" pitchFamily="34" charset="0"/>
+            </a:endParaRPr>
+          </a:p>
+          <a:p>
+            <a:pPr lvl="1">
+              <a:buSzPct val="100000"/>
+            </a:pPr>
+            <a:r>
+              <a:rPr lang="es-PE" sz="2000" dirty="0" smtClean="0">
+                <a:solidFill>
+                  <a:schemeClr val="bg1">
+                    <a:lumMod val="95000"/>
+                    <a:lumOff val="5000"/>
+                  </a:schemeClr>
+                </a:solidFill>
+                <a:latin typeface="Arial" pitchFamily="34" charset="0"/>
+                <a:cs typeface="Arial" pitchFamily="34" charset="0"/>
+              </a:rPr>
+              <a:t>Tiempo: 15 minutos.</a:t>
+            </a:r>
+          </a:p>
+        </p:txBody>
+      </p:sp>
+      <p:sp>
+        <p:nvSpPr>
+          <p:cNvPr id="3" name="2 CuadroTexto"/>
+          <p:cNvSpPr txBox="1"/>
+          <p:nvPr/>
+        </p:nvSpPr>
+        <p:spPr>
+          <a:xfrm>
+            <a:off x="539552" y="260648"/>
+            <a:ext cx="8136904" cy="1446550"/>
+          </a:xfrm>
+          <a:prstGeom prst="rect">
+            <a:avLst/>
+          </a:prstGeom>
+          <a:noFill/>
+        </p:spPr>
+        <p:txBody>
+          <a:bodyPr wrap="square" rtlCol="0">
+            <a:spAutoFit/>
+          </a:bodyPr>
+          <a:lstStyle/>
+          <a:p>
+            <a:pPr algn="ctr"/>
+            <a:r>
+              <a:rPr lang="es-PE" sz="4400" dirty="0" smtClean="0">
+                <a:solidFill>
+                  <a:srgbClr val="00B050"/>
+                </a:solidFill>
+                <a:latin typeface="Arial" pitchFamily="34" charset="0"/>
+                <a:cs typeface="Arial" pitchFamily="34" charset="0"/>
+              </a:rPr>
+              <a:t>Ejercicio – Parte 2</a:t>
+            </a:r>
+            <a:br>
+              <a:rPr lang="es-PE" sz="4400" dirty="0" smtClean="0">
+                <a:solidFill>
+                  <a:srgbClr val="00B050"/>
+                </a:solidFill>
+                <a:latin typeface="Arial" pitchFamily="34" charset="0"/>
+                <a:cs typeface="Arial" pitchFamily="34" charset="0"/>
+              </a:rPr>
+            </a:br>
+            <a:r>
+              <a:rPr lang="es-PE" sz="4400" dirty="0" smtClean="0">
+                <a:solidFill>
+                  <a:srgbClr val="00B050"/>
+                </a:solidFill>
+                <a:latin typeface="Arial" pitchFamily="34" charset="0"/>
+                <a:cs typeface="Arial" pitchFamily="34" charset="0"/>
+              </a:rPr>
+              <a:t>Discutiendo</a:t>
+            </a:r>
+            <a:endParaRPr lang="es-PE" sz="4400" dirty="0" smtClean="0">
+              <a:solidFill>
+                <a:srgbClr val="00B050"/>
+              </a:solidFill>
+              <a:latin typeface="Arial" pitchFamily="34" charset="0"/>
+              <a:cs typeface="Arial" pitchFamily="34" charset="0"/>
+            </a:endParaRPr>
+          </a:p>
+        </p:txBody>
+      </p:sp>
+    </p:spTree>
+    <p:extLst>
+      <p:ext uri="{BB962C8B-B14F-4D97-AF65-F5344CB8AC3E}">
+        <p14:creationId xmlns:p14="http://schemas.microsoft.com/office/powerpoint/2010/main" val="1968987265"/>
+      </p:ext>
+    </p:extLst>
+  </p:cSld>
+  <p:clrMapOvr>
+    <a:masterClrMapping/>
+  </p:clrMapOvr>
+  <mc:AlternateContent xmlns:mc="http://schemas.openxmlformats.org/markup-compatibility/2006" xmlns:p14="http://schemas.microsoft.com/office/powerpoint/2010/main">
+    <mc:Choice Requires="p14">
+      <p:transition p14:dur="0"/>
+    </mc:Choice>
+    <mc:Fallback xmlns="">
+      <p:transition/>
+    </mc:Fallback>
+  </mc:AlternateContent>
+  <p:timing>
+    <p:tnLst>
+      <p:par>
+        <p:cTn id="1" dur="indefinite" restart="never" nodeType="tmRoot"/>
+      </p:par>
+    </p:tnLst>
+  </p:timing>
+</p:sld>
+</file>
+
+<file path=ppt/slides/slide17.xml><?xml version="1.0" encoding="utf-8"?>
+<p:sld xmlns:a="http://schemas.openxmlformats.org/drawingml/2006/main" xmlns:r="http://schemas.openxmlformats.org/officeDocument/2006/relationships" xmlns:p="http://schemas.openxmlformats.org/presentationml/2006/main">
+  <p:cSld>
+    <p:spTree>
+      <p:nvGrpSpPr>
+        <p:cNvPr id="1" name=""/>
+        <p:cNvGrpSpPr/>
+        <p:nvPr/>
+      </p:nvGrpSpPr>
+      <p:grpSpPr>
+        <a:xfrm>
+          <a:off x="0" y="0"/>
+          <a:ext cx="0" cy="0"/>
+          <a:chOff x="0" y="0"/>
+          <a:chExt cx="0" cy="0"/>
+        </a:xfrm>
+      </p:grpSpPr>
+      <p:sp>
+        <p:nvSpPr>
+          <p:cNvPr id="38" name="2 Marcador de contenido"/>
+          <p:cNvSpPr>
+            <a:spLocks noGrp="1"/>
+          </p:cNvSpPr>
+          <p:nvPr>
+            <p:ph idx="1"/>
+          </p:nvPr>
+        </p:nvSpPr>
+        <p:spPr>
+          <a:xfrm>
+            <a:off x="467544" y="2348880"/>
+            <a:ext cx="8352928" cy="2736304"/>
+          </a:xfrm>
+        </p:spPr>
+        <p:txBody>
+          <a:bodyPr/>
+          <a:lstStyle/>
+          <a:p>
+            <a:pPr>
+              <a:buSzPct val="100000"/>
+            </a:pPr>
+            <a:r>
+              <a:rPr lang="es-PE" sz="2400" dirty="0" smtClean="0">
+                <a:solidFill>
+                  <a:schemeClr val="bg1">
+                    <a:lumMod val="95000"/>
+                    <a:lumOff val="5000"/>
+                  </a:schemeClr>
+                </a:solidFill>
+                <a:latin typeface="Arial" pitchFamily="34" charset="0"/>
+                <a:cs typeface="Arial" pitchFamily="34" charset="0"/>
+              </a:rPr>
+              <a:t>Regresar a sus grupos originales.</a:t>
+            </a:r>
+          </a:p>
+          <a:p>
+            <a:pPr>
+              <a:buSzPct val="100000"/>
+            </a:pPr>
+            <a:endParaRPr lang="es-PE" sz="2400" dirty="0" smtClean="0">
+              <a:solidFill>
+                <a:schemeClr val="bg1">
+                  <a:lumMod val="95000"/>
+                  <a:lumOff val="5000"/>
+                </a:schemeClr>
+              </a:solidFill>
+              <a:latin typeface="Arial" pitchFamily="34" charset="0"/>
+              <a:cs typeface="Arial" pitchFamily="34" charset="0"/>
+            </a:endParaRPr>
+          </a:p>
+          <a:p>
+            <a:pPr>
+              <a:buSzPct val="100000"/>
+            </a:pPr>
+            <a:r>
+              <a:rPr lang="es-PE" sz="2400" dirty="0" smtClean="0">
+                <a:solidFill>
+                  <a:schemeClr val="bg1">
+                    <a:lumMod val="95000"/>
+                    <a:lumOff val="5000"/>
+                  </a:schemeClr>
+                </a:solidFill>
+                <a:latin typeface="Arial" pitchFamily="34" charset="0"/>
+                <a:cs typeface="Arial" pitchFamily="34" charset="0"/>
+              </a:rPr>
+              <a:t>Cada uno deberá explicar el patrón al resto de los miembros del grupo. </a:t>
+            </a:r>
+            <a:endParaRPr lang="es-PE" sz="2000" dirty="0">
+              <a:solidFill>
+                <a:schemeClr val="bg1">
+                  <a:lumMod val="95000"/>
+                  <a:lumOff val="5000"/>
+                </a:schemeClr>
+              </a:solidFill>
+              <a:latin typeface="Arial" pitchFamily="34" charset="0"/>
+              <a:cs typeface="Arial" pitchFamily="34" charset="0"/>
+            </a:endParaRPr>
+          </a:p>
+          <a:p>
+            <a:pPr lvl="1">
+              <a:buSzPct val="100000"/>
+            </a:pPr>
+            <a:r>
+              <a:rPr lang="en-US" sz="2000" dirty="0" err="1" smtClean="0">
+                <a:solidFill>
+                  <a:schemeClr val="bg1">
+                    <a:lumMod val="95000"/>
+                    <a:lumOff val="5000"/>
+                  </a:schemeClr>
+                </a:solidFill>
+                <a:latin typeface="Arial" pitchFamily="34" charset="0"/>
+                <a:cs typeface="Arial" pitchFamily="34" charset="0"/>
+              </a:rPr>
+              <a:t>Tiempo</a:t>
+            </a:r>
+            <a:r>
+              <a:rPr lang="en-US" sz="2000" dirty="0" smtClean="0">
+                <a:solidFill>
+                  <a:schemeClr val="bg1">
+                    <a:lumMod val="95000"/>
+                    <a:lumOff val="5000"/>
+                  </a:schemeClr>
+                </a:solidFill>
+                <a:latin typeface="Arial" pitchFamily="34" charset="0"/>
+                <a:cs typeface="Arial" pitchFamily="34" charset="0"/>
+              </a:rPr>
+              <a:t>: 20 </a:t>
+            </a:r>
+            <a:r>
+              <a:rPr lang="en-US" sz="2000" dirty="0" err="1" smtClean="0">
+                <a:solidFill>
+                  <a:schemeClr val="bg1">
+                    <a:lumMod val="95000"/>
+                    <a:lumOff val="5000"/>
+                  </a:schemeClr>
+                </a:solidFill>
+                <a:latin typeface="Arial" pitchFamily="34" charset="0"/>
+                <a:cs typeface="Arial" pitchFamily="34" charset="0"/>
+              </a:rPr>
+              <a:t>minutos</a:t>
+            </a:r>
+            <a:r>
+              <a:rPr lang="en-US" sz="2000" dirty="0" smtClean="0">
+                <a:solidFill>
+                  <a:schemeClr val="bg1">
+                    <a:lumMod val="95000"/>
+                    <a:lumOff val="5000"/>
+                  </a:schemeClr>
+                </a:solidFill>
+                <a:latin typeface="Arial" pitchFamily="34" charset="0"/>
+                <a:cs typeface="Arial" pitchFamily="34" charset="0"/>
+              </a:rPr>
+              <a:t>.</a:t>
+            </a:r>
+            <a:endParaRPr lang="es-PE" sz="2000" dirty="0" smtClean="0">
+              <a:solidFill>
+                <a:schemeClr val="bg1">
+                  <a:lumMod val="95000"/>
+                  <a:lumOff val="5000"/>
+                </a:schemeClr>
+              </a:solidFill>
+              <a:latin typeface="Arial" pitchFamily="34" charset="0"/>
+              <a:cs typeface="Arial" pitchFamily="34" charset="0"/>
+            </a:endParaRPr>
+          </a:p>
+        </p:txBody>
+      </p:sp>
+      <p:sp>
+        <p:nvSpPr>
+          <p:cNvPr id="3" name="2 CuadroTexto"/>
+          <p:cNvSpPr txBox="1"/>
+          <p:nvPr/>
+        </p:nvSpPr>
+        <p:spPr>
+          <a:xfrm>
+            <a:off x="539552" y="260648"/>
+            <a:ext cx="8136904" cy="1446550"/>
+          </a:xfrm>
+          <a:prstGeom prst="rect">
+            <a:avLst/>
+          </a:prstGeom>
+          <a:noFill/>
+        </p:spPr>
+        <p:txBody>
+          <a:bodyPr wrap="square" rtlCol="0">
+            <a:spAutoFit/>
+          </a:bodyPr>
+          <a:lstStyle/>
+          <a:p>
+            <a:pPr algn="ctr"/>
+            <a:r>
+              <a:rPr lang="es-PE" sz="4400" dirty="0" smtClean="0">
+                <a:solidFill>
+                  <a:srgbClr val="00B050"/>
+                </a:solidFill>
+                <a:latin typeface="Arial" pitchFamily="34" charset="0"/>
+                <a:cs typeface="Arial" pitchFamily="34" charset="0"/>
+              </a:rPr>
+              <a:t>Ejercicio – Parte 3</a:t>
+            </a:r>
+            <a:br>
+              <a:rPr lang="es-PE" sz="4400" dirty="0" smtClean="0">
+                <a:solidFill>
+                  <a:srgbClr val="00B050"/>
+                </a:solidFill>
+                <a:latin typeface="Arial" pitchFamily="34" charset="0"/>
+                <a:cs typeface="Arial" pitchFamily="34" charset="0"/>
+              </a:rPr>
+            </a:br>
+            <a:r>
+              <a:rPr lang="es-PE" sz="4400" dirty="0" smtClean="0">
+                <a:solidFill>
+                  <a:srgbClr val="00B050"/>
+                </a:solidFill>
+                <a:latin typeface="Arial" pitchFamily="34" charset="0"/>
+                <a:cs typeface="Arial" pitchFamily="34" charset="0"/>
+              </a:rPr>
+              <a:t>Compartiendo</a:t>
+            </a:r>
+            <a:endParaRPr lang="es-PE" sz="4400" dirty="0" smtClean="0">
+              <a:solidFill>
+                <a:srgbClr val="00B050"/>
+              </a:solidFill>
+              <a:latin typeface="Arial" pitchFamily="34" charset="0"/>
+              <a:cs typeface="Arial" pitchFamily="34" charset="0"/>
+            </a:endParaRPr>
+          </a:p>
+        </p:txBody>
+      </p:sp>
+    </p:spTree>
+    <p:extLst>
+      <p:ext uri="{BB962C8B-B14F-4D97-AF65-F5344CB8AC3E}">
+        <p14:creationId xmlns:p14="http://schemas.microsoft.com/office/powerpoint/2010/main" val="139327075"/>
+      </p:ext>
+    </p:extLst>
+  </p:cSld>
+  <p:clrMapOvr>
+    <a:masterClrMapping/>
+  </p:clrMapOvr>
+  <mc:AlternateContent xmlns:mc="http://schemas.openxmlformats.org/markup-compatibility/2006" xmlns:p14="http://schemas.microsoft.com/office/powerpoint/2010/main">
+    <mc:Choice Requires="p14">
+      <p:transition p14:dur="0"/>
+    </mc:Choice>
+    <mc:Fallback xmlns="">
+      <p:transition/>
+    </mc:Fallback>
+  </mc:AlternateContent>
+  <p:timing>
+    <p:tnLst>
+      <p:par>
+        <p:cTn id="1" dur="indefinite" restart="never" nodeType="tmRoot"/>
+      </p:par>
+    </p:tnLst>
+  </p:timing>
+</p:sld>
+</file>
+
+<file path=ppt/slides/slide18.xml><?xml version="1.0" encoding="utf-8"?>
+<p:sld xmlns:a="http://schemas.openxmlformats.org/drawingml/2006/main" xmlns:r="http://schemas.openxmlformats.org/officeDocument/2006/relationships" xmlns:p="http://schemas.openxmlformats.org/presentationml/2006/main">
+  <p:cSld>
+    <p:spTree>
+      <p:nvGrpSpPr>
+        <p:cNvPr id="1" name=""/>
+        <p:cNvGrpSpPr/>
+        <p:nvPr/>
+      </p:nvGrpSpPr>
+      <p:grpSpPr>
+        <a:xfrm>
+          <a:off x="0" y="0"/>
+          <a:ext cx="0" cy="0"/>
+          <a:chOff x="0" y="0"/>
+          <a:chExt cx="0" cy="0"/>
+        </a:xfrm>
+      </p:grpSpPr>
+      <p:sp>
+        <p:nvSpPr>
+          <p:cNvPr id="38" name="2 Marcador de contenido"/>
+          <p:cNvSpPr>
+            <a:spLocks noGrp="1"/>
+          </p:cNvSpPr>
+          <p:nvPr>
+            <p:ph idx="1"/>
+          </p:nvPr>
+        </p:nvSpPr>
+        <p:spPr>
+          <a:xfrm>
+            <a:off x="467544" y="2348880"/>
+            <a:ext cx="8352928" cy="1008112"/>
+          </a:xfrm>
+        </p:spPr>
+        <p:txBody>
+          <a:bodyPr/>
+          <a:lstStyle/>
+          <a:p>
+            <a:pPr>
+              <a:buSzPct val="100000"/>
+            </a:pPr>
+            <a:r>
+              <a:rPr lang="es-PE" sz="2400" dirty="0" smtClean="0">
+                <a:solidFill>
+                  <a:schemeClr val="bg1">
+                    <a:lumMod val="95000"/>
+                    <a:lumOff val="5000"/>
+                  </a:schemeClr>
+                </a:solidFill>
+                <a:latin typeface="Arial" pitchFamily="34" charset="0"/>
+                <a:cs typeface="Arial" pitchFamily="34" charset="0"/>
+              </a:rPr>
+              <a:t>Practicaremos un ejercicio donde se vea representado cada patrón.</a:t>
+            </a:r>
+            <a:endParaRPr lang="es-PE" sz="2000" dirty="0" smtClean="0">
+              <a:solidFill>
+                <a:schemeClr val="bg1">
+                  <a:lumMod val="95000"/>
+                  <a:lumOff val="5000"/>
+                </a:schemeClr>
+              </a:solidFill>
+              <a:latin typeface="Arial" pitchFamily="34" charset="0"/>
+              <a:cs typeface="Arial" pitchFamily="34" charset="0"/>
+            </a:endParaRPr>
+          </a:p>
+        </p:txBody>
+      </p:sp>
+      <p:sp>
+        <p:nvSpPr>
+          <p:cNvPr id="3" name="2 CuadroTexto"/>
+          <p:cNvSpPr txBox="1"/>
+          <p:nvPr/>
+        </p:nvSpPr>
+        <p:spPr>
+          <a:xfrm>
+            <a:off x="539552" y="260648"/>
+            <a:ext cx="8136904" cy="1446550"/>
+          </a:xfrm>
+          <a:prstGeom prst="rect">
+            <a:avLst/>
+          </a:prstGeom>
+          <a:noFill/>
+        </p:spPr>
+        <p:txBody>
+          <a:bodyPr wrap="square" rtlCol="0">
+            <a:spAutoFit/>
+          </a:bodyPr>
+          <a:lstStyle/>
+          <a:p>
+            <a:pPr algn="ctr"/>
+            <a:r>
+              <a:rPr lang="es-PE" sz="4400" dirty="0" smtClean="0">
+                <a:solidFill>
+                  <a:srgbClr val="00B050"/>
+                </a:solidFill>
+                <a:latin typeface="Arial" pitchFamily="34" charset="0"/>
+                <a:cs typeface="Arial" pitchFamily="34" charset="0"/>
+              </a:rPr>
+              <a:t>Ejercicio – Parte 4</a:t>
+            </a:r>
+            <a:br>
+              <a:rPr lang="es-PE" sz="4400" dirty="0" smtClean="0">
+                <a:solidFill>
+                  <a:srgbClr val="00B050"/>
+                </a:solidFill>
+                <a:latin typeface="Arial" pitchFamily="34" charset="0"/>
+                <a:cs typeface="Arial" pitchFamily="34" charset="0"/>
+              </a:rPr>
+            </a:br>
+            <a:r>
+              <a:rPr lang="es-PE" sz="4400" dirty="0" smtClean="0">
+                <a:solidFill>
+                  <a:srgbClr val="00B050"/>
+                </a:solidFill>
+                <a:latin typeface="Arial" pitchFamily="34" charset="0"/>
+                <a:cs typeface="Arial" pitchFamily="34" charset="0"/>
+              </a:rPr>
+              <a:t>Practicando</a:t>
+            </a:r>
+            <a:endParaRPr lang="es-PE" sz="4400" dirty="0" smtClean="0">
+              <a:solidFill>
+                <a:srgbClr val="00B050"/>
+              </a:solidFill>
+              <a:latin typeface="Arial" pitchFamily="34" charset="0"/>
+              <a:cs typeface="Arial" pitchFamily="34" charset="0"/>
+            </a:endParaRPr>
+          </a:p>
+        </p:txBody>
+      </p:sp>
+    </p:spTree>
+    <p:extLst>
+      <p:ext uri="{BB962C8B-B14F-4D97-AF65-F5344CB8AC3E}">
+        <p14:creationId xmlns:p14="http://schemas.microsoft.com/office/powerpoint/2010/main" val="3572393376"/>
       </p:ext>
     </p:extLst>
   </p:cSld>

</xml_diff>

<commit_message>
Solución UoW - Repository
</commit_message>
<xml_diff>
--- a/Diapositivas/Design Patterns.pptx
+++ b/Diapositivas/Design Patterns.pptx
@@ -5,7 +5,7 @@
     <p:sldMasterId id="2147483660" r:id="rId1"/>
   </p:sldMasterIdLst>
   <p:notesMasterIdLst>
-    <p:notesMasterId r:id="rId20"/>
+    <p:notesMasterId r:id="rId23"/>
   </p:notesMasterIdLst>
   <p:sldIdLst>
     <p:sldId id="256" r:id="rId2"/>
@@ -26,6 +26,9 @@
     <p:sldId id="315" r:id="rId17"/>
     <p:sldId id="316" r:id="rId18"/>
     <p:sldId id="317" r:id="rId19"/>
+    <p:sldId id="318" r:id="rId20"/>
+    <p:sldId id="319" r:id="rId21"/>
+    <p:sldId id="320" r:id="rId22"/>
   </p:sldIdLst>
   <p:sldSz cx="9144000" cy="6858000" type="screen4x3"/>
   <p:notesSz cx="6858000" cy="9144000"/>
@@ -209,7 +212,7 @@
           <a:p>
             <a:fld id="{651770C5-50B1-4017-8384-CA51988A7F0C}" type="datetimeFigureOut">
               <a:rPr lang="es-PE" smtClean="0"/>
-              <a:t>26/06/2013</a:t>
+              <a:t>01/07/2013</a:t>
             </a:fld>
             <a:endParaRPr lang="es-PE"/>
           </a:p>
@@ -1736,6 +1739,90 @@
 </p:notes>
 </file>
 
+<file path=ppt/notesSlides/notesSlide19.xml><?xml version="1.0" encoding="utf-8"?>
+<p:notes xmlns:a="http://schemas.openxmlformats.org/drawingml/2006/main" xmlns:r="http://schemas.openxmlformats.org/officeDocument/2006/relationships" xmlns:p="http://schemas.openxmlformats.org/presentationml/2006/main">
+  <p:cSld>
+    <p:spTree>
+      <p:nvGrpSpPr>
+        <p:cNvPr id="1" name=""/>
+        <p:cNvGrpSpPr/>
+        <p:nvPr/>
+      </p:nvGrpSpPr>
+      <p:grpSpPr>
+        <a:xfrm>
+          <a:off x="0" y="0"/>
+          <a:ext cx="0" cy="0"/>
+          <a:chOff x="0" y="0"/>
+          <a:chExt cx="0" cy="0"/>
+        </a:xfrm>
+      </p:grpSpPr>
+      <p:sp>
+        <p:nvSpPr>
+          <p:cNvPr id="2" name="1 Marcador de imagen de diapositiva"/>
+          <p:cNvSpPr>
+            <a:spLocks noGrp="1" noRot="1" noChangeAspect="1"/>
+          </p:cNvSpPr>
+          <p:nvPr>
+            <p:ph type="sldImg"/>
+          </p:nvPr>
+        </p:nvSpPr>
+        <p:spPr/>
+      </p:sp>
+      <p:sp>
+        <p:nvSpPr>
+          <p:cNvPr id="3" name="2 Marcador de notas"/>
+          <p:cNvSpPr>
+            <a:spLocks noGrp="1"/>
+          </p:cNvSpPr>
+          <p:nvPr>
+            <p:ph type="body" idx="1"/>
+          </p:nvPr>
+        </p:nvSpPr>
+        <p:spPr/>
+        <p:txBody>
+          <a:bodyPr/>
+          <a:lstStyle/>
+          <a:p>
+            <a:endParaRPr lang="es-PE" dirty="0"/>
+          </a:p>
+        </p:txBody>
+      </p:sp>
+      <p:sp>
+        <p:nvSpPr>
+          <p:cNvPr id="4" name="3 Marcador de número de diapositiva"/>
+          <p:cNvSpPr>
+            <a:spLocks noGrp="1"/>
+          </p:cNvSpPr>
+          <p:nvPr>
+            <p:ph type="sldNum" sz="quarter" idx="10"/>
+          </p:nvPr>
+        </p:nvSpPr>
+        <p:spPr/>
+        <p:txBody>
+          <a:bodyPr/>
+          <a:lstStyle/>
+          <a:p>
+            <a:fld id="{96DE5A63-0F1F-4DC0-ADE0-CC17EBA6F230}" type="slidenum">
+              <a:rPr lang="es-PE" smtClean="0"/>
+              <a:t>19</a:t>
+            </a:fld>
+            <a:endParaRPr lang="es-PE"/>
+          </a:p>
+        </p:txBody>
+      </p:sp>
+    </p:spTree>
+    <p:extLst>
+      <p:ext uri="{BB962C8B-B14F-4D97-AF65-F5344CB8AC3E}">
+        <p14:creationId xmlns:p14="http://schemas.microsoft.com/office/powerpoint/2010/main" val="3614550747"/>
+      </p:ext>
+    </p:extLst>
+  </p:cSld>
+  <p:clrMapOvr>
+    <a:masterClrMapping/>
+  </p:clrMapOvr>
+</p:notes>
+</file>
+
 <file path=ppt/notesSlides/notesSlide2.xml><?xml version="1.0" encoding="utf-8"?>
 <p:notes xmlns:a="http://schemas.openxmlformats.org/drawingml/2006/main" xmlns:r="http://schemas.openxmlformats.org/officeDocument/2006/relationships" xmlns:p="http://schemas.openxmlformats.org/presentationml/2006/main">
   <p:cSld>
@@ -1802,6 +1889,174 @@
             <a:fld id="{96DE5A63-0F1F-4DC0-ADE0-CC17EBA6F230}" type="slidenum">
               <a:rPr lang="es-PE" smtClean="0"/>
               <a:t>2</a:t>
+            </a:fld>
+            <a:endParaRPr lang="es-PE"/>
+          </a:p>
+        </p:txBody>
+      </p:sp>
+    </p:spTree>
+    <p:extLst>
+      <p:ext uri="{BB962C8B-B14F-4D97-AF65-F5344CB8AC3E}">
+        <p14:creationId xmlns:p14="http://schemas.microsoft.com/office/powerpoint/2010/main" val="3614550747"/>
+      </p:ext>
+    </p:extLst>
+  </p:cSld>
+  <p:clrMapOvr>
+    <a:masterClrMapping/>
+  </p:clrMapOvr>
+</p:notes>
+</file>
+
+<file path=ppt/notesSlides/notesSlide20.xml><?xml version="1.0" encoding="utf-8"?>
+<p:notes xmlns:a="http://schemas.openxmlformats.org/drawingml/2006/main" xmlns:r="http://schemas.openxmlformats.org/officeDocument/2006/relationships" xmlns:p="http://schemas.openxmlformats.org/presentationml/2006/main">
+  <p:cSld>
+    <p:spTree>
+      <p:nvGrpSpPr>
+        <p:cNvPr id="1" name=""/>
+        <p:cNvGrpSpPr/>
+        <p:nvPr/>
+      </p:nvGrpSpPr>
+      <p:grpSpPr>
+        <a:xfrm>
+          <a:off x="0" y="0"/>
+          <a:ext cx="0" cy="0"/>
+          <a:chOff x="0" y="0"/>
+          <a:chExt cx="0" cy="0"/>
+        </a:xfrm>
+      </p:grpSpPr>
+      <p:sp>
+        <p:nvSpPr>
+          <p:cNvPr id="2" name="1 Marcador de imagen de diapositiva"/>
+          <p:cNvSpPr>
+            <a:spLocks noGrp="1" noRot="1" noChangeAspect="1"/>
+          </p:cNvSpPr>
+          <p:nvPr>
+            <p:ph type="sldImg"/>
+          </p:nvPr>
+        </p:nvSpPr>
+        <p:spPr/>
+      </p:sp>
+      <p:sp>
+        <p:nvSpPr>
+          <p:cNvPr id="3" name="2 Marcador de notas"/>
+          <p:cNvSpPr>
+            <a:spLocks noGrp="1"/>
+          </p:cNvSpPr>
+          <p:nvPr>
+            <p:ph type="body" idx="1"/>
+          </p:nvPr>
+        </p:nvSpPr>
+        <p:spPr/>
+        <p:txBody>
+          <a:bodyPr/>
+          <a:lstStyle/>
+          <a:p>
+            <a:endParaRPr lang="es-PE" dirty="0"/>
+          </a:p>
+        </p:txBody>
+      </p:sp>
+      <p:sp>
+        <p:nvSpPr>
+          <p:cNvPr id="4" name="3 Marcador de número de diapositiva"/>
+          <p:cNvSpPr>
+            <a:spLocks noGrp="1"/>
+          </p:cNvSpPr>
+          <p:nvPr>
+            <p:ph type="sldNum" sz="quarter" idx="10"/>
+          </p:nvPr>
+        </p:nvSpPr>
+        <p:spPr/>
+        <p:txBody>
+          <a:bodyPr/>
+          <a:lstStyle/>
+          <a:p>
+            <a:fld id="{96DE5A63-0F1F-4DC0-ADE0-CC17EBA6F230}" type="slidenum">
+              <a:rPr lang="es-PE" smtClean="0"/>
+              <a:t>20</a:t>
+            </a:fld>
+            <a:endParaRPr lang="es-PE"/>
+          </a:p>
+        </p:txBody>
+      </p:sp>
+    </p:spTree>
+    <p:extLst>
+      <p:ext uri="{BB962C8B-B14F-4D97-AF65-F5344CB8AC3E}">
+        <p14:creationId xmlns:p14="http://schemas.microsoft.com/office/powerpoint/2010/main" val="3614550747"/>
+      </p:ext>
+    </p:extLst>
+  </p:cSld>
+  <p:clrMapOvr>
+    <a:masterClrMapping/>
+  </p:clrMapOvr>
+</p:notes>
+</file>
+
+<file path=ppt/notesSlides/notesSlide21.xml><?xml version="1.0" encoding="utf-8"?>
+<p:notes xmlns:a="http://schemas.openxmlformats.org/drawingml/2006/main" xmlns:r="http://schemas.openxmlformats.org/officeDocument/2006/relationships" xmlns:p="http://schemas.openxmlformats.org/presentationml/2006/main">
+  <p:cSld>
+    <p:spTree>
+      <p:nvGrpSpPr>
+        <p:cNvPr id="1" name=""/>
+        <p:cNvGrpSpPr/>
+        <p:nvPr/>
+      </p:nvGrpSpPr>
+      <p:grpSpPr>
+        <a:xfrm>
+          <a:off x="0" y="0"/>
+          <a:ext cx="0" cy="0"/>
+          <a:chOff x="0" y="0"/>
+          <a:chExt cx="0" cy="0"/>
+        </a:xfrm>
+      </p:grpSpPr>
+      <p:sp>
+        <p:nvSpPr>
+          <p:cNvPr id="2" name="1 Marcador de imagen de diapositiva"/>
+          <p:cNvSpPr>
+            <a:spLocks noGrp="1" noRot="1" noChangeAspect="1"/>
+          </p:cNvSpPr>
+          <p:nvPr>
+            <p:ph type="sldImg"/>
+          </p:nvPr>
+        </p:nvSpPr>
+        <p:spPr/>
+      </p:sp>
+      <p:sp>
+        <p:nvSpPr>
+          <p:cNvPr id="3" name="2 Marcador de notas"/>
+          <p:cNvSpPr>
+            <a:spLocks noGrp="1"/>
+          </p:cNvSpPr>
+          <p:nvPr>
+            <p:ph type="body" idx="1"/>
+          </p:nvPr>
+        </p:nvSpPr>
+        <p:spPr/>
+        <p:txBody>
+          <a:bodyPr/>
+          <a:lstStyle/>
+          <a:p>
+            <a:endParaRPr lang="es-PE" dirty="0"/>
+          </a:p>
+        </p:txBody>
+      </p:sp>
+      <p:sp>
+        <p:nvSpPr>
+          <p:cNvPr id="4" name="3 Marcador de número de diapositiva"/>
+          <p:cNvSpPr>
+            <a:spLocks noGrp="1"/>
+          </p:cNvSpPr>
+          <p:nvPr>
+            <p:ph type="sldNum" sz="quarter" idx="10"/>
+          </p:nvPr>
+        </p:nvSpPr>
+        <p:spPr/>
+        <p:txBody>
+          <a:bodyPr/>
+          <a:lstStyle/>
+          <a:p>
+            <a:fld id="{96DE5A63-0F1F-4DC0-ADE0-CC17EBA6F230}" type="slidenum">
+              <a:rPr lang="es-PE" smtClean="0"/>
+              <a:t>21</a:t>
             </a:fld>
             <a:endParaRPr lang="es-PE"/>
           </a:p>
@@ -2593,7 +2848,7 @@
           <a:p>
             <a:fld id="{D76286B0-60B7-4FD7-B94C-B0421D9B2B26}" type="datetimeFigureOut">
               <a:rPr lang="es-PE" smtClean="0"/>
-              <a:t>26/06/2013</a:t>
+              <a:t>01/07/2013</a:t>
             </a:fld>
             <a:endParaRPr lang="es-PE"/>
           </a:p>
@@ -2770,7 +3025,7 @@
           <a:p>
             <a:fld id="{D76286B0-60B7-4FD7-B94C-B0421D9B2B26}" type="datetimeFigureOut">
               <a:rPr lang="es-PE" smtClean="0"/>
-              <a:t>26/06/2013</a:t>
+              <a:t>01/07/2013</a:t>
             </a:fld>
             <a:endParaRPr lang="es-PE"/>
           </a:p>
@@ -2957,7 +3212,7 @@
           <a:p>
             <a:fld id="{D76286B0-60B7-4FD7-B94C-B0421D9B2B26}" type="datetimeFigureOut">
               <a:rPr lang="es-PE" smtClean="0"/>
-              <a:t>26/06/2013</a:t>
+              <a:t>01/07/2013</a:t>
             </a:fld>
             <a:endParaRPr lang="es-PE"/>
           </a:p>
@@ -3134,7 +3389,7 @@
           <a:p>
             <a:fld id="{D76286B0-60B7-4FD7-B94C-B0421D9B2B26}" type="datetimeFigureOut">
               <a:rPr lang="es-PE" smtClean="0"/>
-              <a:t>26/06/2013</a:t>
+              <a:t>01/07/2013</a:t>
             </a:fld>
             <a:endParaRPr lang="es-PE"/>
           </a:p>
@@ -3387,7 +3642,7 @@
           <a:p>
             <a:fld id="{D76286B0-60B7-4FD7-B94C-B0421D9B2B26}" type="datetimeFigureOut">
               <a:rPr lang="es-PE" smtClean="0"/>
-              <a:t>26/06/2013</a:t>
+              <a:t>01/07/2013</a:t>
             </a:fld>
             <a:endParaRPr lang="es-PE"/>
           </a:p>
@@ -3682,7 +3937,7 @@
           <a:p>
             <a:fld id="{D76286B0-60B7-4FD7-B94C-B0421D9B2B26}" type="datetimeFigureOut">
               <a:rPr lang="es-PE" smtClean="0"/>
-              <a:t>26/06/2013</a:t>
+              <a:t>01/07/2013</a:t>
             </a:fld>
             <a:endParaRPr lang="es-PE"/>
           </a:p>
@@ -4111,7 +4366,7 @@
           <a:p>
             <a:fld id="{D76286B0-60B7-4FD7-B94C-B0421D9B2B26}" type="datetimeFigureOut">
               <a:rPr lang="es-PE" smtClean="0"/>
-              <a:t>26/06/2013</a:t>
+              <a:t>01/07/2013</a:t>
             </a:fld>
             <a:endParaRPr lang="es-PE"/>
           </a:p>
@@ -4236,7 +4491,7 @@
           <a:p>
             <a:fld id="{D76286B0-60B7-4FD7-B94C-B0421D9B2B26}" type="datetimeFigureOut">
               <a:rPr lang="es-PE" smtClean="0"/>
-              <a:t>26/06/2013</a:t>
+              <a:t>01/07/2013</a:t>
             </a:fld>
             <a:endParaRPr lang="es-PE"/>
           </a:p>
@@ -4338,7 +4593,7 @@
           <a:p>
             <a:fld id="{D76286B0-60B7-4FD7-B94C-B0421D9B2B26}" type="datetimeFigureOut">
               <a:rPr lang="es-PE" smtClean="0"/>
-              <a:t>26/06/2013</a:t>
+              <a:t>01/07/2013</a:t>
             </a:fld>
             <a:endParaRPr lang="es-PE"/>
           </a:p>
@@ -4622,7 +4877,7 @@
           <a:p>
             <a:fld id="{D76286B0-60B7-4FD7-B94C-B0421D9B2B26}" type="datetimeFigureOut">
               <a:rPr lang="es-PE" smtClean="0"/>
-              <a:t>26/06/2013</a:t>
+              <a:t>01/07/2013</a:t>
             </a:fld>
             <a:endParaRPr lang="es-PE"/>
           </a:p>
@@ -4889,7 +5144,7 @@
           <a:p>
             <a:fld id="{D76286B0-60B7-4FD7-B94C-B0421D9B2B26}" type="datetimeFigureOut">
               <a:rPr lang="es-PE" smtClean="0"/>
-              <a:t>26/06/2013</a:t>
+              <a:t>01/07/2013</a:t>
             </a:fld>
             <a:endParaRPr lang="es-PE"/>
           </a:p>
@@ -5134,7 +5389,7 @@
           <a:p>
             <a:fld id="{D76286B0-60B7-4FD7-B94C-B0421D9B2B26}" type="datetimeFigureOut">
               <a:rPr lang="es-PE" smtClean="0"/>
-              <a:t>26/06/2013</a:t>
+              <a:t>01/07/2013</a:t>
             </a:fld>
             <a:endParaRPr lang="es-PE"/>
           </a:p>
@@ -7496,20 +7751,7 @@
                 <a:latin typeface="Arial" pitchFamily="34" charset="0"/>
                 <a:cs typeface="Arial" pitchFamily="34" charset="0"/>
               </a:rPr>
-              <a:t>A cada uno se le ha asignado material que corresponde a un patr</a:t>
-            </a:r>
-            <a:r>
-              <a:rPr lang="es-PE" sz="2400" dirty="0" smtClean="0">
-                <a:solidFill>
-                  <a:schemeClr val="bg1">
-                    <a:lumMod val="95000"/>
-                    <a:lumOff val="5000"/>
-                  </a:schemeClr>
-                </a:solidFill>
-                <a:latin typeface="Arial" pitchFamily="34" charset="0"/>
-                <a:cs typeface="Arial" pitchFamily="34" charset="0"/>
-              </a:rPr>
-              <a:t>ón empresarial de diseño.</a:t>
+              <a:t>A cada uno se le ha asignado material que corresponde a un patrón empresarial de diseño.</a:t>
             </a:r>
           </a:p>
           <a:p>
@@ -7617,13 +7859,6 @@
               </a:rPr>
               <a:t>Entendiendo</a:t>
             </a:r>
-            <a:endParaRPr lang="es-PE" sz="4400" dirty="0" smtClean="0">
-              <a:solidFill>
-                <a:srgbClr val="00B050"/>
-              </a:solidFill>
-              <a:latin typeface="Arial" pitchFamily="34" charset="0"/>
-              <a:cs typeface="Arial" pitchFamily="34" charset="0"/>
-            </a:endParaRPr>
           </a:p>
         </p:txBody>
       </p:sp>
@@ -7708,16 +7943,6 @@
               </a:rPr>
               <a:t>Juntarse todos aquellos a los cuales les ha tocado el mismo patrón, discutir lo entendido y pensar cual es la mejor manera de explicar el patrón a su grupo original.</a:t>
             </a:r>
-            <a:endParaRPr lang="es-PE" sz="2400" dirty="0" smtClean="0">
-              <a:solidFill>
-                <a:schemeClr val="bg1">
-                  <a:lumMod val="95000"/>
-                  <a:lumOff val="5000"/>
-                </a:schemeClr>
-              </a:solidFill>
-              <a:latin typeface="Arial" pitchFamily="34" charset="0"/>
-              <a:cs typeface="Arial" pitchFamily="34" charset="0"/>
-            </a:endParaRPr>
           </a:p>
           <a:p>
             <a:pPr lvl="1">
@@ -7791,13 +8016,6 @@
               </a:rPr>
               <a:t>Discutiendo</a:t>
             </a:r>
-            <a:endParaRPr lang="es-PE" sz="4400" dirty="0" smtClean="0">
-              <a:solidFill>
-                <a:srgbClr val="00B050"/>
-              </a:solidFill>
-              <a:latin typeface="Arial" pitchFamily="34" charset="0"/>
-              <a:cs typeface="Arial" pitchFamily="34" charset="0"/>
-            </a:endParaRPr>
           </a:p>
         </p:txBody>
       </p:sp>
@@ -8047,13 +8265,6 @@
               </a:rPr>
               <a:t>Compartiendo</a:t>
             </a:r>
-            <a:endParaRPr lang="es-PE" sz="4400" dirty="0" smtClean="0">
-              <a:solidFill>
-                <a:srgbClr val="00B050"/>
-              </a:solidFill>
-              <a:latin typeface="Arial" pitchFamily="34" charset="0"/>
-              <a:cs typeface="Arial" pitchFamily="34" charset="0"/>
-            </a:endParaRPr>
           </a:p>
         </p:txBody>
       </p:sp>
@@ -8203,6 +8414,382 @@
               </a:rPr>
               <a:t>Practicando</a:t>
             </a:r>
+          </a:p>
+        </p:txBody>
+      </p:sp>
+    </p:spTree>
+    <p:extLst>
+      <p:ext uri="{BB962C8B-B14F-4D97-AF65-F5344CB8AC3E}">
+        <p14:creationId xmlns:p14="http://schemas.microsoft.com/office/powerpoint/2010/main" val="3572393376"/>
+      </p:ext>
+    </p:extLst>
+  </p:cSld>
+  <p:clrMapOvr>
+    <a:masterClrMapping/>
+  </p:clrMapOvr>
+  <mc:AlternateContent xmlns:mc="http://schemas.openxmlformats.org/markup-compatibility/2006" xmlns:p14="http://schemas.microsoft.com/office/powerpoint/2010/main">
+    <mc:Choice Requires="p14">
+      <p:transition p14:dur="0"/>
+    </mc:Choice>
+    <mc:Fallback xmlns="">
+      <p:transition/>
+    </mc:Fallback>
+  </mc:AlternateContent>
+  <p:timing>
+    <p:tnLst>
+      <p:par>
+        <p:cTn id="1" dur="indefinite" restart="never" nodeType="tmRoot"/>
+      </p:par>
+    </p:tnLst>
+  </p:timing>
+</p:sld>
+</file>
+
+<file path=ppt/slides/slide19.xml><?xml version="1.0" encoding="utf-8"?>
+<p:sld xmlns:a="http://schemas.openxmlformats.org/drawingml/2006/main" xmlns:r="http://schemas.openxmlformats.org/officeDocument/2006/relationships" xmlns:p="http://schemas.openxmlformats.org/presentationml/2006/main">
+  <p:cSld>
+    <p:spTree>
+      <p:nvGrpSpPr>
+        <p:cNvPr id="1" name=""/>
+        <p:cNvGrpSpPr/>
+        <p:nvPr/>
+      </p:nvGrpSpPr>
+      <p:grpSpPr>
+        <a:xfrm>
+          <a:off x="0" y="0"/>
+          <a:ext cx="0" cy="0"/>
+          <a:chOff x="0" y="0"/>
+          <a:chExt cx="0" cy="0"/>
+        </a:xfrm>
+      </p:grpSpPr>
+      <p:sp>
+        <p:nvSpPr>
+          <p:cNvPr id="38" name="2 Marcador de contenido"/>
+          <p:cNvSpPr>
+            <a:spLocks noGrp="1"/>
+          </p:cNvSpPr>
+          <p:nvPr>
+            <p:ph idx="1"/>
+          </p:nvPr>
+        </p:nvSpPr>
+        <p:spPr>
+          <a:xfrm>
+            <a:off x="467544" y="2348880"/>
+            <a:ext cx="8352928" cy="1008112"/>
+          </a:xfrm>
+        </p:spPr>
+        <p:txBody>
+          <a:bodyPr/>
+          <a:lstStyle/>
+          <a:p>
+            <a:pPr>
+              <a:buSzPct val="100000"/>
+            </a:pPr>
+            <a:r>
+              <a:rPr lang="es-PE" sz="2400" dirty="0">
+                <a:solidFill>
+                  <a:schemeClr val="bg1">
+                    <a:lumMod val="95000"/>
+                    <a:lumOff val="5000"/>
+                  </a:schemeClr>
+                </a:solidFill>
+                <a:latin typeface="Arial" pitchFamily="34" charset="0"/>
+                <a:cs typeface="Arial" pitchFamily="34" charset="0"/>
+              </a:rPr>
+              <a:t>¿</a:t>
+            </a:r>
+            <a:r>
+              <a:rPr lang="es-PE" sz="2400" dirty="0" smtClean="0">
+                <a:solidFill>
+                  <a:schemeClr val="bg1">
+                    <a:lumMod val="95000"/>
+                    <a:lumOff val="5000"/>
+                  </a:schemeClr>
+                </a:solidFill>
+                <a:latin typeface="Arial" pitchFamily="34" charset="0"/>
+                <a:cs typeface="Arial" pitchFamily="34" charset="0"/>
+              </a:rPr>
+              <a:t>Qué es el patrón repositorio?</a:t>
+            </a:r>
+          </a:p>
+          <a:p>
+            <a:pPr>
+              <a:buSzPct val="100000"/>
+            </a:pPr>
+            <a:endParaRPr lang="es-PE" sz="2400" dirty="0" smtClean="0">
+              <a:solidFill>
+                <a:schemeClr val="bg1">
+                  <a:lumMod val="95000"/>
+                  <a:lumOff val="5000"/>
+                </a:schemeClr>
+              </a:solidFill>
+              <a:latin typeface="Arial" pitchFamily="34" charset="0"/>
+              <a:cs typeface="Arial" pitchFamily="34" charset="0"/>
+            </a:endParaRPr>
+          </a:p>
+          <a:p>
+            <a:pPr>
+              <a:buSzPct val="100000"/>
+            </a:pPr>
+            <a:r>
+              <a:rPr lang="es-PE" sz="2400" dirty="0" smtClean="0">
+                <a:solidFill>
+                  <a:schemeClr val="bg1">
+                    <a:lumMod val="95000"/>
+                    <a:lumOff val="5000"/>
+                  </a:schemeClr>
+                </a:solidFill>
+                <a:latin typeface="Arial" pitchFamily="34" charset="0"/>
+                <a:cs typeface="Arial" pitchFamily="34" charset="0"/>
+              </a:rPr>
+              <a:t>¿Cuál es la diferencia con el patr</a:t>
+            </a:r>
+            <a:r>
+              <a:rPr lang="es-PE" sz="2400" dirty="0" smtClean="0">
+                <a:solidFill>
+                  <a:schemeClr val="bg1">
+                    <a:lumMod val="95000"/>
+                    <a:lumOff val="5000"/>
+                  </a:schemeClr>
+                </a:solidFill>
+                <a:latin typeface="Arial" pitchFamily="34" charset="0"/>
+                <a:cs typeface="Arial" pitchFamily="34" charset="0"/>
+              </a:rPr>
+              <a:t>ón DAO</a:t>
+            </a:r>
+            <a:r>
+              <a:rPr lang="en-US" sz="2400" dirty="0" smtClean="0">
+                <a:solidFill>
+                  <a:schemeClr val="bg1">
+                    <a:lumMod val="95000"/>
+                    <a:lumOff val="5000"/>
+                  </a:schemeClr>
+                </a:solidFill>
+                <a:latin typeface="Arial" pitchFamily="34" charset="0"/>
+                <a:cs typeface="Arial" pitchFamily="34" charset="0"/>
+              </a:rPr>
+              <a:t>?</a:t>
+            </a:r>
+          </a:p>
+          <a:p>
+            <a:pPr>
+              <a:buSzPct val="100000"/>
+            </a:pPr>
+            <a:endParaRPr lang="en-US" sz="2400" dirty="0">
+              <a:solidFill>
+                <a:schemeClr val="bg1">
+                  <a:lumMod val="95000"/>
+                  <a:lumOff val="5000"/>
+                </a:schemeClr>
+              </a:solidFill>
+              <a:latin typeface="Arial" pitchFamily="34" charset="0"/>
+              <a:cs typeface="Arial" pitchFamily="34" charset="0"/>
+            </a:endParaRPr>
+          </a:p>
+          <a:p>
+            <a:pPr>
+              <a:buSzPct val="100000"/>
+            </a:pPr>
+            <a:r>
+              <a:rPr lang="es-PE" sz="2400" dirty="0" smtClean="0">
+                <a:solidFill>
+                  <a:schemeClr val="bg1">
+                    <a:lumMod val="95000"/>
+                    <a:lumOff val="5000"/>
+                  </a:schemeClr>
+                </a:solidFill>
+                <a:latin typeface="Arial" pitchFamily="34" charset="0"/>
+                <a:cs typeface="Arial" pitchFamily="34" charset="0"/>
+              </a:rPr>
+              <a:t>¿Por qu</a:t>
+            </a:r>
+            <a:r>
+              <a:rPr lang="es-PE" sz="2400" dirty="0" smtClean="0">
+                <a:solidFill>
+                  <a:schemeClr val="bg1">
+                    <a:lumMod val="95000"/>
+                    <a:lumOff val="5000"/>
+                  </a:schemeClr>
+                </a:solidFill>
+                <a:latin typeface="Arial" pitchFamily="34" charset="0"/>
+                <a:cs typeface="Arial" pitchFamily="34" charset="0"/>
+              </a:rPr>
+              <a:t>é cuando </a:t>
+            </a:r>
+            <a:r>
+              <a:rPr lang="es-PE" sz="2400" dirty="0" smtClean="0">
+                <a:solidFill>
+                  <a:schemeClr val="bg1">
+                    <a:lumMod val="95000"/>
+                    <a:lumOff val="5000"/>
+                  </a:schemeClr>
+                </a:solidFill>
+                <a:latin typeface="Arial" pitchFamily="34" charset="0"/>
+                <a:cs typeface="Arial" pitchFamily="34" charset="0"/>
+              </a:rPr>
+              <a:t>utilizamos ADO.NET usualmente llamamos a </a:t>
+            </a:r>
+            <a:r>
+              <a:rPr lang="es-PE" sz="2400" dirty="0" err="1" smtClean="0">
+                <a:solidFill>
+                  <a:schemeClr val="bg1">
+                    <a:lumMod val="95000"/>
+                    <a:lumOff val="5000"/>
+                  </a:schemeClr>
+                </a:solidFill>
+                <a:latin typeface="Arial" pitchFamily="34" charset="0"/>
+                <a:cs typeface="Arial" pitchFamily="34" charset="0"/>
+              </a:rPr>
+              <a:t>DataAccessObjects</a:t>
+            </a:r>
+            <a:r>
+              <a:rPr lang="es-PE" sz="2400" dirty="0" smtClean="0">
+                <a:solidFill>
+                  <a:schemeClr val="bg1">
+                    <a:lumMod val="95000"/>
+                    <a:lumOff val="5000"/>
+                  </a:schemeClr>
+                </a:solidFill>
+                <a:latin typeface="Arial" pitchFamily="34" charset="0"/>
+                <a:cs typeface="Arial" pitchFamily="34" charset="0"/>
+              </a:rPr>
+              <a:t> y con EF </a:t>
+            </a:r>
+            <a:r>
+              <a:rPr lang="es-PE" sz="2400" dirty="0" err="1" smtClean="0">
+                <a:solidFill>
+                  <a:schemeClr val="bg1">
+                    <a:lumMod val="95000"/>
+                    <a:lumOff val="5000"/>
+                  </a:schemeClr>
+                </a:solidFill>
+                <a:latin typeface="Arial" pitchFamily="34" charset="0"/>
+                <a:cs typeface="Arial" pitchFamily="34" charset="0"/>
+              </a:rPr>
+              <a:t>Repositories</a:t>
+            </a:r>
+            <a:r>
+              <a:rPr lang="en-US" sz="2400" dirty="0">
+                <a:solidFill>
+                  <a:schemeClr val="bg1">
+                    <a:lumMod val="95000"/>
+                    <a:lumOff val="5000"/>
+                  </a:schemeClr>
+                </a:solidFill>
+                <a:latin typeface="Arial" pitchFamily="34" charset="0"/>
+                <a:cs typeface="Arial" pitchFamily="34" charset="0"/>
+              </a:rPr>
+              <a:t>?</a:t>
+            </a:r>
+            <a:endParaRPr lang="es-PE" sz="2000" dirty="0" smtClean="0">
+              <a:solidFill>
+                <a:schemeClr val="bg1">
+                  <a:lumMod val="95000"/>
+                  <a:lumOff val="5000"/>
+                </a:schemeClr>
+              </a:solidFill>
+              <a:latin typeface="Arial" pitchFamily="34" charset="0"/>
+              <a:cs typeface="Arial" pitchFamily="34" charset="0"/>
+            </a:endParaRPr>
+          </a:p>
+        </p:txBody>
+      </p:sp>
+      <p:sp>
+        <p:nvSpPr>
+          <p:cNvPr id="3" name="2 CuadroTexto"/>
+          <p:cNvSpPr txBox="1"/>
+          <p:nvPr/>
+        </p:nvSpPr>
+        <p:spPr>
+          <a:xfrm>
+            <a:off x="539552" y="260648"/>
+            <a:ext cx="8136904" cy="1446550"/>
+          </a:xfrm>
+          <a:prstGeom prst="rect">
+            <a:avLst/>
+          </a:prstGeom>
+          <a:noFill/>
+        </p:spPr>
+        <p:txBody>
+          <a:bodyPr wrap="square" rtlCol="0">
+            <a:spAutoFit/>
+          </a:bodyPr>
+          <a:lstStyle/>
+          <a:p>
+            <a:pPr algn="ctr"/>
+            <a:r>
+              <a:rPr lang="es-PE" sz="4400" dirty="0" smtClean="0">
+                <a:solidFill>
+                  <a:srgbClr val="00B050"/>
+                </a:solidFill>
+                <a:latin typeface="Arial" pitchFamily="34" charset="0"/>
+                <a:cs typeface="Arial" pitchFamily="34" charset="0"/>
+              </a:rPr>
+              <a:t>Ejercicio </a:t>
+            </a:r>
+            <a:r>
+              <a:rPr lang="en-US" sz="4400" dirty="0" smtClean="0">
+                <a:solidFill>
+                  <a:srgbClr val="00B050"/>
+                </a:solidFill>
+                <a:latin typeface="Arial" pitchFamily="34" charset="0"/>
+                <a:cs typeface="Arial" pitchFamily="34" charset="0"/>
+              </a:rPr>
+              <a:t>- </a:t>
+            </a:r>
+            <a:r>
+              <a:rPr lang="es-PE" sz="4400" dirty="0" err="1" smtClean="0">
+                <a:solidFill>
+                  <a:srgbClr val="00B050"/>
+                </a:solidFill>
+                <a:latin typeface="Arial" pitchFamily="34" charset="0"/>
+                <a:cs typeface="Arial" pitchFamily="34" charset="0"/>
+              </a:rPr>
+              <a:t>Repository</a:t>
+            </a:r>
+            <a:r>
+              <a:rPr lang="es-PE" sz="4400" dirty="0" smtClean="0">
+                <a:solidFill>
+                  <a:srgbClr val="00B050"/>
+                </a:solidFill>
+                <a:latin typeface="Arial" pitchFamily="34" charset="0"/>
+                <a:cs typeface="Arial" pitchFamily="34" charset="0"/>
+              </a:rPr>
+              <a:t> </a:t>
+            </a:r>
+            <a:r>
+              <a:rPr lang="es-PE" sz="4400" dirty="0" err="1" smtClean="0">
+                <a:solidFill>
+                  <a:srgbClr val="00B050"/>
+                </a:solidFill>
+                <a:latin typeface="Arial" pitchFamily="34" charset="0"/>
+                <a:cs typeface="Arial" pitchFamily="34" charset="0"/>
+              </a:rPr>
+              <a:t>Pattern</a:t>
+            </a:r>
+            <a:r>
+              <a:rPr lang="es-PE" sz="4400" dirty="0" smtClean="0">
+                <a:solidFill>
+                  <a:srgbClr val="00B050"/>
+                </a:solidFill>
+                <a:latin typeface="Arial" pitchFamily="34" charset="0"/>
+                <a:cs typeface="Arial" pitchFamily="34" charset="0"/>
+              </a:rPr>
+              <a:t> </a:t>
+            </a:r>
+          </a:p>
+          <a:p>
+            <a:pPr algn="ctr"/>
+            <a:r>
+              <a:rPr lang="en-US" sz="4400" dirty="0" err="1" smtClean="0">
+                <a:solidFill>
+                  <a:srgbClr val="00B050"/>
+                </a:solidFill>
+                <a:latin typeface="Arial" pitchFamily="34" charset="0"/>
+                <a:cs typeface="Arial" pitchFamily="34" charset="0"/>
+              </a:rPr>
+              <a:t>Recordando</a:t>
+            </a:r>
             <a:endParaRPr lang="es-PE" sz="4400" dirty="0" smtClean="0">
               <a:solidFill>
                 <a:srgbClr val="00B050"/>
@@ -8216,7 +8803,7 @@
     </p:spTree>
     <p:extLst>
       <p:ext uri="{BB962C8B-B14F-4D97-AF65-F5344CB8AC3E}">
-        <p14:creationId xmlns:p14="http://schemas.microsoft.com/office/powerpoint/2010/main" val="3572393376"/>
+        <p14:creationId xmlns:p14="http://schemas.microsoft.com/office/powerpoint/2010/main" val="1991341768"/>
       </p:ext>
     </p:extLst>
   </p:cSld>
@@ -8474,6 +9061,507 @@
     <p:extLst>
       <p:ext uri="{BB962C8B-B14F-4D97-AF65-F5344CB8AC3E}">
         <p14:creationId xmlns:p14="http://schemas.microsoft.com/office/powerpoint/2010/main" val="784647920"/>
+      </p:ext>
+    </p:extLst>
+  </p:cSld>
+  <p:clrMapOvr>
+    <a:masterClrMapping/>
+  </p:clrMapOvr>
+  <mc:AlternateContent xmlns:mc="http://schemas.openxmlformats.org/markup-compatibility/2006" xmlns:p14="http://schemas.microsoft.com/office/powerpoint/2010/main">
+    <mc:Choice Requires="p14">
+      <p:transition p14:dur="0"/>
+    </mc:Choice>
+    <mc:Fallback xmlns="">
+      <p:transition/>
+    </mc:Fallback>
+  </mc:AlternateContent>
+  <p:timing>
+    <p:tnLst>
+      <p:par>
+        <p:cTn id="1" dur="indefinite" restart="never" nodeType="tmRoot"/>
+      </p:par>
+    </p:tnLst>
+  </p:timing>
+</p:sld>
+</file>
+
+<file path=ppt/slides/slide20.xml><?xml version="1.0" encoding="utf-8"?>
+<p:sld xmlns:a="http://schemas.openxmlformats.org/drawingml/2006/main" xmlns:r="http://schemas.openxmlformats.org/officeDocument/2006/relationships" xmlns:p="http://schemas.openxmlformats.org/presentationml/2006/main">
+  <p:cSld>
+    <p:spTree>
+      <p:nvGrpSpPr>
+        <p:cNvPr id="1" name=""/>
+        <p:cNvGrpSpPr/>
+        <p:nvPr/>
+      </p:nvGrpSpPr>
+      <p:grpSpPr>
+        <a:xfrm>
+          <a:off x="0" y="0"/>
+          <a:ext cx="0" cy="0"/>
+          <a:chOff x="0" y="0"/>
+          <a:chExt cx="0" cy="0"/>
+        </a:xfrm>
+      </p:grpSpPr>
+      <p:sp>
+        <p:nvSpPr>
+          <p:cNvPr id="38" name="2 Marcador de contenido"/>
+          <p:cNvSpPr>
+            <a:spLocks noGrp="1"/>
+          </p:cNvSpPr>
+          <p:nvPr>
+            <p:ph idx="1"/>
+          </p:nvPr>
+        </p:nvSpPr>
+        <p:spPr>
+          <a:xfrm>
+            <a:off x="467544" y="2348880"/>
+            <a:ext cx="8352928" cy="1872208"/>
+          </a:xfrm>
+        </p:spPr>
+        <p:txBody>
+          <a:bodyPr/>
+          <a:lstStyle/>
+          <a:p>
+            <a:pPr>
+              <a:buSzPct val="100000"/>
+            </a:pPr>
+            <a:r>
+              <a:rPr lang="es-PE" sz="2400" smtClean="0">
+                <a:solidFill>
+                  <a:schemeClr val="bg1">
+                    <a:lumMod val="95000"/>
+                    <a:lumOff val="5000"/>
+                  </a:schemeClr>
+                </a:solidFill>
+                <a:latin typeface="Arial" pitchFamily="34" charset="0"/>
+                <a:cs typeface="Arial" pitchFamily="34" charset="0"/>
+              </a:rPr>
+              <a:t>Basado en la definición de Repository, </a:t>
+            </a:r>
+            <a:br>
+              <a:rPr lang="es-PE" sz="2400" smtClean="0">
+                <a:solidFill>
+                  <a:schemeClr val="bg1">
+                    <a:lumMod val="95000"/>
+                    <a:lumOff val="5000"/>
+                  </a:schemeClr>
+                </a:solidFill>
+                <a:latin typeface="Arial" pitchFamily="34" charset="0"/>
+                <a:cs typeface="Arial" pitchFamily="34" charset="0"/>
+              </a:rPr>
+            </a:br>
+            <a:r>
+              <a:rPr lang="es-PE" sz="2400" smtClean="0">
+                <a:solidFill>
+                  <a:schemeClr val="bg1">
+                    <a:lumMod val="95000"/>
+                    <a:lumOff val="5000"/>
+                  </a:schemeClr>
+                </a:solidFill>
+                <a:latin typeface="Arial" pitchFamily="34" charset="0"/>
+                <a:cs typeface="Arial" pitchFamily="34" charset="0"/>
+              </a:rPr>
+              <a:t>¿Por qué la clase AccountRepository no es realmente un repositorio?</a:t>
+            </a:r>
+          </a:p>
+          <a:p>
+            <a:pPr>
+              <a:buSzPct val="100000"/>
+            </a:pPr>
+            <a:endParaRPr lang="es-PE" sz="2400" smtClean="0">
+              <a:solidFill>
+                <a:schemeClr val="bg1">
+                  <a:lumMod val="95000"/>
+                  <a:lumOff val="5000"/>
+                </a:schemeClr>
+              </a:solidFill>
+              <a:latin typeface="Arial" pitchFamily="34" charset="0"/>
+              <a:cs typeface="Arial" pitchFamily="34" charset="0"/>
+            </a:endParaRPr>
+          </a:p>
+          <a:p>
+            <a:pPr>
+              <a:buSzPct val="100000"/>
+            </a:pPr>
+            <a:endParaRPr lang="es-PE" sz="2000" smtClean="0">
+              <a:solidFill>
+                <a:schemeClr val="bg1">
+                  <a:lumMod val="95000"/>
+                  <a:lumOff val="5000"/>
+                </a:schemeClr>
+              </a:solidFill>
+              <a:latin typeface="Arial" pitchFamily="34" charset="0"/>
+              <a:cs typeface="Arial" pitchFamily="34" charset="0"/>
+            </a:endParaRPr>
+          </a:p>
+        </p:txBody>
+      </p:sp>
+      <p:sp>
+        <p:nvSpPr>
+          <p:cNvPr id="3" name="2 CuadroTexto"/>
+          <p:cNvSpPr txBox="1"/>
+          <p:nvPr/>
+        </p:nvSpPr>
+        <p:spPr>
+          <a:xfrm>
+            <a:off x="539552" y="260648"/>
+            <a:ext cx="8136904" cy="1446550"/>
+          </a:xfrm>
+          <a:prstGeom prst="rect">
+            <a:avLst/>
+          </a:prstGeom>
+          <a:noFill/>
+        </p:spPr>
+        <p:txBody>
+          <a:bodyPr wrap="square" rtlCol="0">
+            <a:spAutoFit/>
+          </a:bodyPr>
+          <a:lstStyle/>
+          <a:p>
+            <a:pPr algn="ctr"/>
+            <a:r>
+              <a:rPr lang="es-PE" sz="4400" dirty="0" smtClean="0">
+                <a:solidFill>
+                  <a:srgbClr val="00B050"/>
+                </a:solidFill>
+                <a:latin typeface="Arial" pitchFamily="34" charset="0"/>
+                <a:cs typeface="Arial" pitchFamily="34" charset="0"/>
+              </a:rPr>
+              <a:t>Ejercicio </a:t>
+            </a:r>
+            <a:r>
+              <a:rPr lang="en-US" sz="4400" dirty="0" smtClean="0">
+                <a:solidFill>
+                  <a:srgbClr val="00B050"/>
+                </a:solidFill>
+                <a:latin typeface="Arial" pitchFamily="34" charset="0"/>
+                <a:cs typeface="Arial" pitchFamily="34" charset="0"/>
+              </a:rPr>
+              <a:t>- </a:t>
+            </a:r>
+            <a:r>
+              <a:rPr lang="es-PE" sz="4400" dirty="0" err="1" smtClean="0">
+                <a:solidFill>
+                  <a:srgbClr val="00B050"/>
+                </a:solidFill>
+                <a:latin typeface="Arial" pitchFamily="34" charset="0"/>
+                <a:cs typeface="Arial" pitchFamily="34" charset="0"/>
+              </a:rPr>
+              <a:t>Repository</a:t>
+            </a:r>
+            <a:r>
+              <a:rPr lang="es-PE" sz="4400" dirty="0" smtClean="0">
+                <a:solidFill>
+                  <a:srgbClr val="00B050"/>
+                </a:solidFill>
+                <a:latin typeface="Arial" pitchFamily="34" charset="0"/>
+                <a:cs typeface="Arial" pitchFamily="34" charset="0"/>
+              </a:rPr>
+              <a:t> </a:t>
+            </a:r>
+            <a:r>
+              <a:rPr lang="es-PE" sz="4400" dirty="0" err="1" smtClean="0">
+                <a:solidFill>
+                  <a:srgbClr val="00B050"/>
+                </a:solidFill>
+                <a:latin typeface="Arial" pitchFamily="34" charset="0"/>
+                <a:cs typeface="Arial" pitchFamily="34" charset="0"/>
+              </a:rPr>
+              <a:t>Pattern</a:t>
+            </a:r>
+            <a:r>
+              <a:rPr lang="es-PE" sz="4400" dirty="0" smtClean="0">
+                <a:solidFill>
+                  <a:srgbClr val="00B050"/>
+                </a:solidFill>
+                <a:latin typeface="Arial" pitchFamily="34" charset="0"/>
+                <a:cs typeface="Arial" pitchFamily="34" charset="0"/>
+              </a:rPr>
+              <a:t> </a:t>
+            </a:r>
+          </a:p>
+          <a:p>
+            <a:pPr algn="ctr"/>
+            <a:r>
+              <a:rPr lang="en-US" sz="4400" dirty="0" err="1" smtClean="0">
+                <a:solidFill>
+                  <a:srgbClr val="00B050"/>
+                </a:solidFill>
+                <a:latin typeface="Arial" pitchFamily="34" charset="0"/>
+                <a:cs typeface="Arial" pitchFamily="34" charset="0"/>
+              </a:rPr>
+              <a:t>Analizando</a:t>
+            </a:r>
+            <a:endParaRPr lang="es-PE" sz="4400" dirty="0" smtClean="0">
+              <a:solidFill>
+                <a:srgbClr val="00B050"/>
+              </a:solidFill>
+              <a:latin typeface="Arial" pitchFamily="34" charset="0"/>
+              <a:cs typeface="Arial" pitchFamily="34" charset="0"/>
+            </a:endParaRPr>
+          </a:p>
+        </p:txBody>
+      </p:sp>
+    </p:spTree>
+    <p:extLst>
+      <p:ext uri="{BB962C8B-B14F-4D97-AF65-F5344CB8AC3E}">
+        <p14:creationId xmlns:p14="http://schemas.microsoft.com/office/powerpoint/2010/main" val="4082951045"/>
+      </p:ext>
+    </p:extLst>
+  </p:cSld>
+  <p:clrMapOvr>
+    <a:masterClrMapping/>
+  </p:clrMapOvr>
+  <mc:AlternateContent xmlns:mc="http://schemas.openxmlformats.org/markup-compatibility/2006" xmlns:p14="http://schemas.microsoft.com/office/powerpoint/2010/main">
+    <mc:Choice Requires="p14">
+      <p:transition p14:dur="0"/>
+    </mc:Choice>
+    <mc:Fallback xmlns="">
+      <p:transition/>
+    </mc:Fallback>
+  </mc:AlternateContent>
+  <p:timing>
+    <p:tnLst>
+      <p:par>
+        <p:cTn id="1" dur="indefinite" restart="never" nodeType="tmRoot"/>
+      </p:par>
+    </p:tnLst>
+  </p:timing>
+</p:sld>
+</file>
+
+<file path=ppt/slides/slide21.xml><?xml version="1.0" encoding="utf-8"?>
+<p:sld xmlns:a="http://schemas.openxmlformats.org/drawingml/2006/main" xmlns:r="http://schemas.openxmlformats.org/officeDocument/2006/relationships" xmlns:p="http://schemas.openxmlformats.org/presentationml/2006/main">
+  <p:cSld>
+    <p:spTree>
+      <p:nvGrpSpPr>
+        <p:cNvPr id="1" name=""/>
+        <p:cNvGrpSpPr/>
+        <p:nvPr/>
+      </p:nvGrpSpPr>
+      <p:grpSpPr>
+        <a:xfrm>
+          <a:off x="0" y="0"/>
+          <a:ext cx="0" cy="0"/>
+          <a:chOff x="0" y="0"/>
+          <a:chExt cx="0" cy="0"/>
+        </a:xfrm>
+      </p:grpSpPr>
+      <p:sp>
+        <p:nvSpPr>
+          <p:cNvPr id="38" name="2 Marcador de contenido"/>
+          <p:cNvSpPr>
+            <a:spLocks noGrp="1"/>
+          </p:cNvSpPr>
+          <p:nvPr>
+            <p:ph idx="1"/>
+          </p:nvPr>
+        </p:nvSpPr>
+        <p:spPr>
+          <a:xfrm>
+            <a:off x="467544" y="2348880"/>
+            <a:ext cx="8352928" cy="1008112"/>
+          </a:xfrm>
+        </p:spPr>
+        <p:txBody>
+          <a:bodyPr/>
+          <a:lstStyle/>
+          <a:p>
+            <a:pPr>
+              <a:buSzPct val="100000"/>
+            </a:pPr>
+            <a:r>
+              <a:rPr lang="es-PE" sz="2400" smtClean="0">
+                <a:solidFill>
+                  <a:schemeClr val="bg1">
+                    <a:lumMod val="95000"/>
+                    <a:lumOff val="5000"/>
+                  </a:schemeClr>
+                </a:solidFill>
+                <a:latin typeface="Arial" pitchFamily="34" charset="0"/>
+                <a:cs typeface="Arial" pitchFamily="34" charset="0"/>
+              </a:rPr>
+              <a:t>¿Qué es el patrón UoW?</a:t>
+            </a:r>
+          </a:p>
+          <a:p>
+            <a:pPr>
+              <a:buSzPct val="100000"/>
+            </a:pPr>
+            <a:endParaRPr lang="es-PE" sz="2400" smtClean="0">
+              <a:solidFill>
+                <a:schemeClr val="bg1">
+                  <a:lumMod val="95000"/>
+                  <a:lumOff val="5000"/>
+                </a:schemeClr>
+              </a:solidFill>
+              <a:latin typeface="Arial" pitchFamily="34" charset="0"/>
+              <a:cs typeface="Arial" pitchFamily="34" charset="0"/>
+            </a:endParaRPr>
+          </a:p>
+          <a:p>
+            <a:pPr>
+              <a:buSzPct val="100000"/>
+            </a:pPr>
+            <a:r>
+              <a:rPr lang="es-PE" sz="2400" smtClean="0">
+                <a:solidFill>
+                  <a:schemeClr val="bg1">
+                    <a:lumMod val="95000"/>
+                    <a:lumOff val="5000"/>
+                  </a:schemeClr>
+                </a:solidFill>
+                <a:latin typeface="Arial" pitchFamily="34" charset="0"/>
+                <a:cs typeface="Arial" pitchFamily="34" charset="0"/>
+              </a:rPr>
+              <a:t>¿</a:t>
+            </a:r>
+            <a:r>
+              <a:rPr lang="es-PE" sz="2400" smtClean="0">
+                <a:solidFill>
+                  <a:schemeClr val="bg1">
+                    <a:lumMod val="95000"/>
+                    <a:lumOff val="5000"/>
+                  </a:schemeClr>
+                </a:solidFill>
+                <a:latin typeface="Arial" pitchFamily="34" charset="0"/>
+                <a:cs typeface="Arial" pitchFamily="34" charset="0"/>
+              </a:rPr>
+              <a:t>Por qué el DbContext de EF es una implementación de este patrón?</a:t>
+            </a:r>
+            <a:endParaRPr lang="es-PE" sz="2000" smtClean="0">
+              <a:solidFill>
+                <a:schemeClr val="bg1">
+                  <a:lumMod val="95000"/>
+                  <a:lumOff val="5000"/>
+                </a:schemeClr>
+              </a:solidFill>
+              <a:latin typeface="Arial" pitchFamily="34" charset="0"/>
+              <a:cs typeface="Arial" pitchFamily="34" charset="0"/>
+            </a:endParaRPr>
+          </a:p>
+        </p:txBody>
+      </p:sp>
+      <p:sp>
+        <p:nvSpPr>
+          <p:cNvPr id="3" name="2 CuadroTexto"/>
+          <p:cNvSpPr txBox="1"/>
+          <p:nvPr/>
+        </p:nvSpPr>
+        <p:spPr>
+          <a:xfrm>
+            <a:off x="539552" y="260648"/>
+            <a:ext cx="8136904" cy="1446550"/>
+          </a:xfrm>
+          <a:prstGeom prst="rect">
+            <a:avLst/>
+          </a:prstGeom>
+          <a:noFill/>
+        </p:spPr>
+        <p:txBody>
+          <a:bodyPr wrap="square" rtlCol="0">
+            <a:spAutoFit/>
+          </a:bodyPr>
+          <a:lstStyle/>
+          <a:p>
+            <a:pPr algn="ctr"/>
+            <a:r>
+              <a:rPr lang="es-PE" sz="4400" dirty="0" smtClean="0">
+                <a:solidFill>
+                  <a:srgbClr val="00B050"/>
+                </a:solidFill>
+                <a:latin typeface="Arial" pitchFamily="34" charset="0"/>
+                <a:cs typeface="Arial" pitchFamily="34" charset="0"/>
+              </a:rPr>
+              <a:t>Ejercicio </a:t>
+            </a:r>
+            <a:r>
+              <a:rPr lang="en-US" sz="4400" dirty="0" smtClean="0">
+                <a:solidFill>
+                  <a:srgbClr val="00B050"/>
+                </a:solidFill>
+                <a:latin typeface="Arial" pitchFamily="34" charset="0"/>
+                <a:cs typeface="Arial" pitchFamily="34" charset="0"/>
+              </a:rPr>
+              <a:t>- </a:t>
+            </a:r>
+            <a:r>
+              <a:rPr lang="es-PE" sz="4400" dirty="0" err="1">
+                <a:solidFill>
+                  <a:srgbClr val="00B050"/>
+                </a:solidFill>
+                <a:latin typeface="Arial" pitchFamily="34" charset="0"/>
+                <a:cs typeface="Arial" pitchFamily="34" charset="0"/>
+              </a:rPr>
+              <a:t>U</a:t>
+            </a:r>
+            <a:r>
+              <a:rPr lang="es-PE" sz="4400" dirty="0" err="1" smtClean="0">
+                <a:solidFill>
+                  <a:srgbClr val="00B050"/>
+                </a:solidFill>
+                <a:latin typeface="Arial" pitchFamily="34" charset="0"/>
+                <a:cs typeface="Arial" pitchFamily="34" charset="0"/>
+              </a:rPr>
+              <a:t>oW</a:t>
+            </a:r>
+            <a:r>
+              <a:rPr lang="es-PE" sz="4400" dirty="0" smtClean="0">
+                <a:solidFill>
+                  <a:srgbClr val="00B050"/>
+                </a:solidFill>
+                <a:latin typeface="Arial" pitchFamily="34" charset="0"/>
+                <a:cs typeface="Arial" pitchFamily="34" charset="0"/>
+              </a:rPr>
+              <a:t> </a:t>
+            </a:r>
+            <a:r>
+              <a:rPr lang="es-PE" sz="4400" dirty="0" err="1" smtClean="0">
+                <a:solidFill>
+                  <a:srgbClr val="00B050"/>
+                </a:solidFill>
+                <a:latin typeface="Arial" pitchFamily="34" charset="0"/>
+                <a:cs typeface="Arial" pitchFamily="34" charset="0"/>
+              </a:rPr>
+              <a:t>Pattern</a:t>
+            </a:r>
+            <a:r>
+              <a:rPr lang="es-PE" sz="4400" dirty="0" smtClean="0">
+                <a:solidFill>
+                  <a:srgbClr val="00B050"/>
+                </a:solidFill>
+                <a:latin typeface="Arial" pitchFamily="34" charset="0"/>
+                <a:cs typeface="Arial" pitchFamily="34" charset="0"/>
+              </a:rPr>
+              <a:t> </a:t>
+            </a:r>
+          </a:p>
+          <a:p>
+            <a:pPr algn="ctr"/>
+            <a:r>
+              <a:rPr lang="en-US" sz="4400" dirty="0" err="1" smtClean="0">
+                <a:solidFill>
+                  <a:srgbClr val="00B050"/>
+                </a:solidFill>
+                <a:latin typeface="Arial" pitchFamily="34" charset="0"/>
+                <a:cs typeface="Arial" pitchFamily="34" charset="0"/>
+              </a:rPr>
+              <a:t>Recordando</a:t>
+            </a:r>
+            <a:endParaRPr lang="es-PE" sz="4400" dirty="0" smtClean="0">
+              <a:solidFill>
+                <a:srgbClr val="00B050"/>
+              </a:solidFill>
+              <a:latin typeface="Arial" pitchFamily="34" charset="0"/>
+              <a:cs typeface="Arial" pitchFamily="34" charset="0"/>
+            </a:endParaRPr>
+          </a:p>
+        </p:txBody>
+      </p:sp>
+    </p:spTree>
+    <p:extLst>
+      <p:ext uri="{BB962C8B-B14F-4D97-AF65-F5344CB8AC3E}">
+        <p14:creationId xmlns:p14="http://schemas.microsoft.com/office/powerpoint/2010/main" val="148414507"/>
       </p:ext>
     </p:extLst>
   </p:cSld>

</xml_diff>